<commit_message>
presentation and also some new images
</commit_message>
<xml_diff>
--- a/reports & presentations/Preprocessing and Feature Extraction for.pptx
+++ b/reports & presentations/Preprocessing and Feature Extraction for.pptx
@@ -5,10 +5,10 @@
     <p:sldMasterId id="2147483649" r:id="rId1"/>
   </p:sldMasterIdLst>
   <p:notesMasterIdLst>
-    <p:notesMasterId r:id="rId20"/>
+    <p:notesMasterId r:id="rId32"/>
   </p:notesMasterIdLst>
   <p:handoutMasterIdLst>
-    <p:handoutMasterId r:id="rId21"/>
+    <p:handoutMasterId r:id="rId33"/>
   </p:handoutMasterIdLst>
   <p:sldIdLst>
     <p:sldId id="257" r:id="rId2"/>
@@ -22,18 +22,30 @@
     <p:sldId id="272" r:id="rId10"/>
     <p:sldId id="273" r:id="rId11"/>
     <p:sldId id="274" r:id="rId12"/>
-    <p:sldId id="275" r:id="rId13"/>
-    <p:sldId id="261" r:id="rId14"/>
-    <p:sldId id="262" r:id="rId15"/>
-    <p:sldId id="263" r:id="rId16"/>
-    <p:sldId id="266" r:id="rId17"/>
-    <p:sldId id="264" r:id="rId18"/>
-    <p:sldId id="265" r:id="rId19"/>
+    <p:sldId id="278" r:id="rId13"/>
+    <p:sldId id="284" r:id="rId14"/>
+    <p:sldId id="281" r:id="rId15"/>
+    <p:sldId id="285" r:id="rId16"/>
+    <p:sldId id="275" r:id="rId17"/>
+    <p:sldId id="282" r:id="rId18"/>
+    <p:sldId id="277" r:id="rId19"/>
+    <p:sldId id="283" r:id="rId20"/>
+    <p:sldId id="290" r:id="rId21"/>
+    <p:sldId id="287" r:id="rId22"/>
+    <p:sldId id="286" r:id="rId23"/>
+    <p:sldId id="288" r:id="rId24"/>
+    <p:sldId id="291" r:id="rId25"/>
+    <p:sldId id="261" r:id="rId26"/>
+    <p:sldId id="262" r:id="rId27"/>
+    <p:sldId id="263" r:id="rId28"/>
+    <p:sldId id="266" r:id="rId29"/>
+    <p:sldId id="264" r:id="rId30"/>
+    <p:sldId id="265" r:id="rId31"/>
   </p:sldIdLst>
   <p:sldSz cx="9906000" cy="6858000" type="A4"/>
   <p:notesSz cx="6821488" cy="9969500"/>
   <p:custDataLst>
-    <p:tags r:id="rId22"/>
+    <p:tags r:id="rId34"/>
   </p:custDataLst>
   <p:defaultTextStyle>
     <a:defPPr>
@@ -1278,6 +1290,91 @@
     <p:extLst>
       <p:ext uri="{BB962C8B-B14F-4D97-AF65-F5344CB8AC3E}">
         <p14:creationId xmlns:p14="http://schemas.microsoft.com/office/powerpoint/2010/main" val="551420383"/>
+      </p:ext>
+    </p:extLst>
+  </p:cSld>
+  <p:clrMapOvr>
+    <a:masterClrMapping/>
+  </p:clrMapOvr>
+</p:notes>
+</file>
+
+<file path=ppt/notesSlides/notesSlide3.xml><?xml version="1.0" encoding="utf-8"?>
+<p:notes xmlns:a="http://schemas.openxmlformats.org/drawingml/2006/main" xmlns:r="http://schemas.openxmlformats.org/officeDocument/2006/relationships" xmlns:p="http://schemas.openxmlformats.org/presentationml/2006/main">
+  <p:cSld>
+    <p:spTree>
+      <p:nvGrpSpPr>
+        <p:cNvPr id="1" name=""/>
+        <p:cNvGrpSpPr/>
+        <p:nvPr/>
+      </p:nvGrpSpPr>
+      <p:grpSpPr>
+        <a:xfrm>
+          <a:off x="0" y="0"/>
+          <a:ext cx="0" cy="0"/>
+          <a:chOff x="0" y="0"/>
+          <a:chExt cx="0" cy="0"/>
+        </a:xfrm>
+      </p:grpSpPr>
+      <p:sp>
+        <p:nvSpPr>
+          <p:cNvPr id="2" name="Slide Image Placeholder 1"/>
+          <p:cNvSpPr>
+            <a:spLocks noGrp="1" noRot="1" noChangeAspect="1"/>
+          </p:cNvSpPr>
+          <p:nvPr>
+            <p:ph type="sldImg"/>
+          </p:nvPr>
+        </p:nvSpPr>
+        <p:spPr/>
+      </p:sp>
+      <p:sp>
+        <p:nvSpPr>
+          <p:cNvPr id="3" name="Notes Placeholder 2"/>
+          <p:cNvSpPr>
+            <a:spLocks noGrp="1"/>
+          </p:cNvSpPr>
+          <p:nvPr>
+            <p:ph type="body" idx="1"/>
+          </p:nvPr>
+        </p:nvSpPr>
+        <p:spPr/>
+        <p:txBody>
+          <a:bodyPr/>
+          <a:lstStyle/>
+          <a:p>
+            <a:endParaRPr lang="fi-FI" dirty="0"/>
+          </a:p>
+        </p:txBody>
+      </p:sp>
+      <p:sp>
+        <p:nvSpPr>
+          <p:cNvPr id="4" name="Slide Number Placeholder 3"/>
+          <p:cNvSpPr>
+            <a:spLocks noGrp="1"/>
+          </p:cNvSpPr>
+          <p:nvPr>
+            <p:ph type="sldNum" sz="quarter" idx="10"/>
+          </p:nvPr>
+        </p:nvSpPr>
+        <p:spPr/>
+        <p:txBody>
+          <a:bodyPr/>
+          <a:lstStyle/>
+          <a:p>
+            <a:fld id="{83C03934-2B65-4887-BED9-6DF7CD723B42}" type="slidenum">
+              <a:rPr lang="en-US" altLang="ja-JP" smtClean="0"/>
+              <a:pPr/>
+              <a:t>21</a:t>
+            </a:fld>
+            <a:endParaRPr lang="en-US" altLang="ja-JP"/>
+          </a:p>
+        </p:txBody>
+      </p:sp>
+    </p:spTree>
+    <p:extLst>
+      <p:ext uri="{BB962C8B-B14F-4D97-AF65-F5344CB8AC3E}">
+        <p14:creationId xmlns:p14="http://schemas.microsoft.com/office/powerpoint/2010/main" val="3199471848"/>
       </p:ext>
     </p:extLst>
   </p:cSld>
@@ -6213,6 +6310,20 @@
               </a:rPr>
             </a:br>
             <a:r>
+              <a:rPr lang="fi-FI" altLang="ja-JP" dirty="0" smtClean="0">
+                <a:solidFill>
+                  <a:srgbClr val="000000"/>
+                </a:solidFill>
+                <a:highlight>
+                  <a:scrgbClr r="0" g="0" b="0">
+                    <a:alpha val="0"/>
+                  </a:scrgbClr>
+                </a:highlight>
+                <a:ea typeface="ＭＳ Ｐゴシック" pitchFamily="50"/>
+              </a:rPr>
+              <a:t>Offline Handwriting </a:t>
+            </a:r>
+            <a:r>
               <a:rPr lang="fi-FI" altLang="ja-JP" dirty="0">
                 <a:solidFill>
                   <a:srgbClr val="000000"/>
@@ -6224,7 +6335,7 @@
                 </a:highlight>
                 <a:ea typeface="ＭＳ Ｐゴシック" pitchFamily="50"/>
               </a:rPr>
-              <a:t>Handwriting Recognition</a:t>
+              <a:t>Recognition</a:t>
             </a:r>
             <a:r>
               <a:rPr lang="en-US" altLang="ja-JP" dirty="0" smtClean="0"/>
@@ -6363,20 +6474,35 @@
             </a:r>
             <a:r>
               <a:rPr lang="fi-FI" dirty="0" smtClean="0"/>
-              <a:t>with uneven lightning or texture</a:t>
-            </a:r>
-          </a:p>
-          <a:p>
+              <a:t>with uneven lightning or </a:t>
+            </a:r>
             <a:r>
               <a:rPr lang="fi-FI" dirty="0" smtClean="0"/>
-              <a:t>Enhanced version of Nilback binarization algorithm</a:t>
-            </a:r>
+              <a:t>texture.</a:t>
+            </a:r>
+            <a:endParaRPr lang="fi-FI" dirty="0" smtClean="0"/>
           </a:p>
           <a:p>
             <a:r>
               <a:rPr lang="fi-FI" dirty="0" smtClean="0"/>
-              <a:t>Can apply different algorithms to textual and non-textual areas of the image</a:t>
-            </a:r>
+              <a:t>Enhanced version of Nilback binarization </a:t>
+            </a:r>
+            <a:r>
+              <a:rPr lang="fi-FI" dirty="0" smtClean="0"/>
+              <a:t>algorithm.</a:t>
+            </a:r>
+            <a:endParaRPr lang="fi-FI" dirty="0" smtClean="0"/>
+          </a:p>
+          <a:p>
+            <a:r>
+              <a:rPr lang="fi-FI" dirty="0" smtClean="0"/>
+              <a:t>Can apply different algorithms to textual and non-textual areas of the </a:t>
+            </a:r>
+            <a:r>
+              <a:rPr lang="fi-FI" dirty="0" smtClean="0"/>
+              <a:t>image. (Nilback can only detect varying lightning)</a:t>
+            </a:r>
+            <a:endParaRPr lang="fi-FI" dirty="0" smtClean="0"/>
           </a:p>
           <a:p>
             <a:endParaRPr lang="fi-FI" dirty="0" smtClean="0"/>
@@ -6438,7 +6564,7 @@
         </p:nvSpPr>
         <p:spPr>
           <a:xfrm>
-            <a:off x="485665" y="3805589"/>
+            <a:off x="485665" y="4264391"/>
             <a:ext cx="1296144" cy="830997"/>
           </a:xfrm>
           <a:prstGeom prst="rect">
@@ -6491,7 +6617,7 @@
         </p:nvSpPr>
         <p:spPr bwMode="auto">
           <a:xfrm flipV="1">
-            <a:off x="1791443" y="4221088"/>
+            <a:off x="1791443" y="4679890"/>
             <a:ext cx="252081" cy="0"/>
           </a:xfrm>
           <a:prstGeom prst="line">
@@ -6545,7 +6671,7 @@
         </p:nvSpPr>
         <p:spPr>
           <a:xfrm>
-            <a:off x="2018081" y="3661573"/>
+            <a:off x="2018081" y="4120375"/>
             <a:ext cx="1512168" cy="1077218"/>
           </a:xfrm>
           <a:prstGeom prst="rect">
@@ -6606,7 +6732,7 @@
         </p:nvSpPr>
         <p:spPr>
           <a:xfrm>
-            <a:off x="3763184" y="3537797"/>
+            <a:off x="3763184" y="3996599"/>
             <a:ext cx="2701984" cy="584775"/>
           </a:xfrm>
           <a:prstGeom prst="rect">
@@ -6657,7 +6783,7 @@
         </p:nvSpPr>
         <p:spPr>
           <a:xfrm>
-            <a:off x="3763184" y="4283389"/>
+            <a:off x="3763184" y="4742191"/>
             <a:ext cx="2701984" cy="584775"/>
           </a:xfrm>
           <a:prstGeom prst="rect">
@@ -6708,7 +6834,7 @@
         </p:nvSpPr>
         <p:spPr>
           <a:xfrm>
-            <a:off x="6698103" y="3415352"/>
+            <a:off x="6698103" y="3874154"/>
             <a:ext cx="1854851" cy="1569660"/>
           </a:xfrm>
           <a:prstGeom prst="rect">
@@ -6765,7 +6891,7 @@
         </p:nvSpPr>
         <p:spPr>
           <a:xfrm>
-            <a:off x="8807497" y="3928699"/>
+            <a:off x="8807497" y="4387501"/>
             <a:ext cx="896161" cy="584775"/>
           </a:xfrm>
           <a:prstGeom prst="rect">
@@ -6818,7 +6944,7 @@
         </p:nvSpPr>
         <p:spPr bwMode="auto">
           <a:xfrm flipV="1">
-            <a:off x="3530249" y="3830184"/>
+            <a:off x="3530249" y="4288986"/>
             <a:ext cx="252081" cy="0"/>
           </a:xfrm>
           <a:prstGeom prst="line">
@@ -6874,7 +7000,7 @@
         </p:nvSpPr>
         <p:spPr bwMode="auto">
           <a:xfrm flipV="1">
-            <a:off x="3530249" y="4492570"/>
+            <a:off x="3530249" y="4951372"/>
             <a:ext cx="252081" cy="0"/>
           </a:xfrm>
           <a:prstGeom prst="line">
@@ -6930,7 +7056,7 @@
         </p:nvSpPr>
         <p:spPr bwMode="auto">
           <a:xfrm>
-            <a:off x="6465168" y="3830184"/>
+            <a:off x="6465168" y="4288986"/>
             <a:ext cx="223301" cy="390904"/>
           </a:xfrm>
           <a:prstGeom prst="line">
@@ -6986,7 +7112,7 @@
         </p:nvSpPr>
         <p:spPr bwMode="auto">
           <a:xfrm flipV="1">
-            <a:off x="6465168" y="4221088"/>
+            <a:off x="6465168" y="4679890"/>
             <a:ext cx="232935" cy="354686"/>
           </a:xfrm>
           <a:prstGeom prst="line">
@@ -7042,7 +7168,7 @@
         </p:nvSpPr>
         <p:spPr bwMode="auto">
           <a:xfrm>
-            <a:off x="8562588" y="4221088"/>
+            <a:off x="8562588" y="4679890"/>
             <a:ext cx="252081" cy="0"/>
           </a:xfrm>
           <a:prstGeom prst="line">
@@ -7166,8 +7292,13 @@
             </a:r>
             <a:r>
               <a:rPr lang="en-US" dirty="0" smtClean="0"/>
-              <a:t> algorithm woks as follows</a:t>
-            </a:r>
+              <a:t> algorithm woks as </a:t>
+            </a:r>
+            <a:r>
+              <a:rPr lang="en-US" dirty="0" smtClean="0"/>
+              <a:t>follows.</a:t>
+            </a:r>
+            <a:endParaRPr lang="en-US" dirty="0" smtClean="0"/>
           </a:p>
           <a:p>
             <a:r>
@@ -7229,7 +7360,39 @@
             <a:pPr lvl="1"/>
             <a:r>
               <a:rPr lang="en-US" dirty="0" smtClean="0"/>
-              <a:t>PADDING = method to handle border pixels e.g. ‘replicate’</a:t>
+              <a:t>PADDING = method to handle border pixels e.g. ‘replicate</a:t>
+            </a:r>
+            <a:r>
+              <a:rPr lang="en-US" dirty="0" smtClean="0"/>
+              <a:t>’</a:t>
+            </a:r>
+          </a:p>
+          <a:p>
+            <a:pPr lvl="1"/>
+            <a:r>
+              <a:rPr lang="en-US" dirty="0" smtClean="0"/>
+              <a:t>BW = resulting binary image</a:t>
+            </a:r>
+            <a:endParaRPr lang="en-US" dirty="0" smtClean="0"/>
+          </a:p>
+          <a:p>
+            <a:r>
+              <a:rPr lang="en-US" dirty="0" smtClean="0"/>
+              <a:t>Lower </a:t>
+            </a:r>
+            <a:r>
+              <a:rPr lang="en-US" dirty="0" err="1" smtClean="0"/>
+              <a:t>Nilback</a:t>
+            </a:r>
+            <a:r>
+              <a:rPr lang="en-US" dirty="0" smtClean="0"/>
+              <a:t> thresholds leave noise on image</a:t>
+            </a:r>
+          </a:p>
+          <a:p>
+            <a:r>
+              <a:rPr lang="en-US" dirty="0" smtClean="0"/>
+              <a:t>Higher thresholds begin to lose information</a:t>
             </a:r>
             <a:endParaRPr lang="en-US" dirty="0"/>
           </a:p>
@@ -7332,35 +7495,41 @@
           <a:p>
             <a:r>
               <a:rPr lang="fi-FI" dirty="0" smtClean="0"/>
-              <a:t>NICK algorithm</a:t>
+              <a:t>Original image</a:t>
             </a:r>
             <a:endParaRPr lang="fi-FI" dirty="0"/>
           </a:p>
         </p:txBody>
       </p:sp>
-      <p:sp>
-        <p:nvSpPr>
-          <p:cNvPr id="3" name="Content Placeholder 2"/>
-          <p:cNvSpPr>
-            <a:spLocks noGrp="1"/>
-          </p:cNvSpPr>
+      <p:pic>
+        <p:nvPicPr>
+          <p:cNvPr id="6" name="Content Placeholder 5"/>
+          <p:cNvPicPr>
+            <a:picLocks noGrp="1" noChangeAspect="1"/>
+          </p:cNvPicPr>
           <p:nvPr>
             <p:ph idx="1"/>
           </p:nvPr>
-        </p:nvSpPr>
-        <p:spPr/>
-        <p:txBody>
-          <a:bodyPr/>
-          <a:lstStyle/>
-          <a:p>
-            <a:r>
-              <a:rPr lang="fi-FI" dirty="0" smtClean="0"/>
-              <a:t>todo</a:t>
-            </a:r>
-            <a:endParaRPr lang="fi-FI" dirty="0"/>
-          </a:p>
-        </p:txBody>
-      </p:sp>
+        </p:nvPicPr>
+        <p:blipFill>
+          <a:blip r:embed="rId2" cstate="print">
+            <a:extLst>
+              <a:ext uri="{28A0092B-C50C-407E-A947-70E740481C1C}">
+                <a14:useLocalDpi xmlns:a14="http://schemas.microsoft.com/office/drawing/2010/main" val="0"/>
+              </a:ext>
+            </a:extLst>
+          </a:blip>
+          <a:stretch>
+            <a:fillRect/>
+          </a:stretch>
+        </p:blipFill>
+        <p:spPr>
+          <a:xfrm>
+            <a:off x="1558895" y="1100553"/>
+            <a:ext cx="6698770" cy="5025044"/>
+          </a:xfrm>
+        </p:spPr>
+      </p:pic>
       <p:sp>
         <p:nvSpPr>
           <p:cNvPr id="4" name="Footer Placeholder 3"/>
@@ -7403,6 +7572,566 @@
               <a:rPr lang="en-US" altLang="ja-JP" smtClean="0"/>
               <a:pPr/>
               <a:t>11</a:t>
+            </a:fld>
+            <a:endParaRPr lang="en-US" altLang="ja-JP"/>
+          </a:p>
+        </p:txBody>
+      </p:sp>
+    </p:spTree>
+    <p:extLst>
+      <p:ext uri="{BB962C8B-B14F-4D97-AF65-F5344CB8AC3E}">
+        <p14:creationId xmlns:p14="http://schemas.microsoft.com/office/powerpoint/2010/main" val="2954387975"/>
+      </p:ext>
+    </p:extLst>
+  </p:cSld>
+  <p:clrMapOvr>
+    <a:masterClrMapping/>
+  </p:clrMapOvr>
+</p:sld>
+</file>
+
+<file path=ppt/slides/slide13.xml><?xml version="1.0" encoding="utf-8"?>
+<p:sld xmlns:a="http://schemas.openxmlformats.org/drawingml/2006/main" xmlns:r="http://schemas.openxmlformats.org/officeDocument/2006/relationships" xmlns:p="http://schemas.openxmlformats.org/presentationml/2006/main">
+  <p:cSld>
+    <p:spTree>
+      <p:nvGrpSpPr>
+        <p:cNvPr id="1" name=""/>
+        <p:cNvGrpSpPr/>
+        <p:nvPr/>
+      </p:nvGrpSpPr>
+      <p:grpSpPr>
+        <a:xfrm>
+          <a:off x="0" y="0"/>
+          <a:ext cx="0" cy="0"/>
+          <a:chOff x="0" y="0"/>
+          <a:chExt cx="0" cy="0"/>
+        </a:xfrm>
+      </p:grpSpPr>
+      <p:sp>
+        <p:nvSpPr>
+          <p:cNvPr id="2" name="Title 1"/>
+          <p:cNvSpPr>
+            <a:spLocks noGrp="1"/>
+          </p:cNvSpPr>
+          <p:nvPr>
+            <p:ph type="title"/>
+          </p:nvPr>
+        </p:nvSpPr>
+        <p:spPr/>
+        <p:txBody>
+          <a:bodyPr/>
+          <a:lstStyle/>
+          <a:p>
+            <a:r>
+              <a:rPr lang="fi-FI" dirty="0"/>
+              <a:t>Image after binarization. Window size 100 threshold </a:t>
+            </a:r>
+            <a:r>
+              <a:rPr lang="fi-FI" dirty="0" smtClean="0"/>
+              <a:t>0.1</a:t>
+            </a:r>
+            <a:endParaRPr lang="fi-FI" dirty="0"/>
+          </a:p>
+        </p:txBody>
+      </p:sp>
+      <p:pic>
+        <p:nvPicPr>
+          <p:cNvPr id="6" name="Content Placeholder 5"/>
+          <p:cNvPicPr>
+            <a:picLocks noGrp="1" noChangeAspect="1"/>
+          </p:cNvPicPr>
+          <p:nvPr>
+            <p:ph idx="1"/>
+          </p:nvPr>
+        </p:nvPicPr>
+        <p:blipFill rotWithShape="1">
+          <a:blip r:embed="rId2">
+            <a:extLst>
+              <a:ext uri="{28A0092B-C50C-407E-A947-70E740481C1C}">
+                <a14:useLocalDpi xmlns:a14="http://schemas.microsoft.com/office/drawing/2010/main" val="0"/>
+              </a:ext>
+            </a:extLst>
+          </a:blip>
+          <a:srcRect b="7594"/>
+          <a:stretch/>
+        </p:blipFill>
+        <p:spPr>
+          <a:xfrm>
+            <a:off x="774946" y="836712"/>
+            <a:ext cx="8266667" cy="5412334"/>
+          </a:xfrm>
+        </p:spPr>
+      </p:pic>
+      <p:sp>
+        <p:nvSpPr>
+          <p:cNvPr id="4" name="Footer Placeholder 3"/>
+          <p:cNvSpPr>
+            <a:spLocks noGrp="1"/>
+          </p:cNvSpPr>
+          <p:nvPr>
+            <p:ph type="ftr" sz="quarter" idx="10"/>
+          </p:nvPr>
+        </p:nvSpPr>
+        <p:spPr/>
+        <p:txBody>
+          <a:bodyPr/>
+          <a:lstStyle/>
+          <a:p>
+            <a:r>
+              <a:rPr lang="ja-JP" altLang="en-US" smtClean="0"/>
+              <a:t>研究室ゼミ</a:t>
+            </a:r>
+            <a:endParaRPr lang="en-US" altLang="ja-JP"/>
+          </a:p>
+        </p:txBody>
+      </p:sp>
+      <p:sp>
+        <p:nvSpPr>
+          <p:cNvPr id="5" name="Slide Number Placeholder 4"/>
+          <p:cNvSpPr>
+            <a:spLocks noGrp="1"/>
+          </p:cNvSpPr>
+          <p:nvPr>
+            <p:ph type="sldNum" sz="quarter" idx="11"/>
+          </p:nvPr>
+        </p:nvSpPr>
+        <p:spPr/>
+        <p:txBody>
+          <a:bodyPr/>
+          <a:lstStyle/>
+          <a:p>
+            <a:fld id="{87D0AC98-BE4D-4AA9-9598-A155CF901337}" type="slidenum">
+              <a:rPr lang="en-US" altLang="ja-JP" smtClean="0"/>
+              <a:pPr/>
+              <a:t>12</a:t>
+            </a:fld>
+            <a:endParaRPr lang="en-US" altLang="ja-JP"/>
+          </a:p>
+        </p:txBody>
+      </p:sp>
+    </p:spTree>
+    <p:extLst>
+      <p:ext uri="{BB962C8B-B14F-4D97-AF65-F5344CB8AC3E}">
+        <p14:creationId xmlns:p14="http://schemas.microsoft.com/office/powerpoint/2010/main" val="1937555158"/>
+      </p:ext>
+    </p:extLst>
+  </p:cSld>
+  <p:clrMapOvr>
+    <a:masterClrMapping/>
+  </p:clrMapOvr>
+</p:sld>
+</file>
+
+<file path=ppt/slides/slide14.xml><?xml version="1.0" encoding="utf-8"?>
+<p:sld xmlns:a="http://schemas.openxmlformats.org/drawingml/2006/main" xmlns:r="http://schemas.openxmlformats.org/officeDocument/2006/relationships" xmlns:p="http://schemas.openxmlformats.org/presentationml/2006/main">
+  <p:cSld>
+    <p:spTree>
+      <p:nvGrpSpPr>
+        <p:cNvPr id="1" name=""/>
+        <p:cNvGrpSpPr/>
+        <p:nvPr/>
+      </p:nvGrpSpPr>
+      <p:grpSpPr>
+        <a:xfrm>
+          <a:off x="0" y="0"/>
+          <a:ext cx="0" cy="0"/>
+          <a:chOff x="0" y="0"/>
+          <a:chExt cx="0" cy="0"/>
+        </a:xfrm>
+      </p:grpSpPr>
+      <p:sp>
+        <p:nvSpPr>
+          <p:cNvPr id="2" name="Title 1"/>
+          <p:cNvSpPr>
+            <a:spLocks noGrp="1"/>
+          </p:cNvSpPr>
+          <p:nvPr>
+            <p:ph type="title"/>
+          </p:nvPr>
+        </p:nvSpPr>
+        <p:spPr/>
+        <p:txBody>
+          <a:bodyPr/>
+          <a:lstStyle/>
+          <a:p>
+            <a:r>
+              <a:rPr lang="fi-FI" dirty="0" smtClean="0"/>
+              <a:t>Image after binarization. Window size 100 threshold 0.4</a:t>
+            </a:r>
+            <a:endParaRPr lang="fi-FI" dirty="0"/>
+          </a:p>
+        </p:txBody>
+      </p:sp>
+      <p:sp>
+        <p:nvSpPr>
+          <p:cNvPr id="4" name="Footer Placeholder 3"/>
+          <p:cNvSpPr>
+            <a:spLocks noGrp="1"/>
+          </p:cNvSpPr>
+          <p:nvPr>
+            <p:ph type="ftr" sz="quarter" idx="10"/>
+          </p:nvPr>
+        </p:nvSpPr>
+        <p:spPr/>
+        <p:txBody>
+          <a:bodyPr/>
+          <a:lstStyle/>
+          <a:p>
+            <a:r>
+              <a:rPr lang="ja-JP" altLang="en-US" smtClean="0"/>
+              <a:t>研究室ゼミ</a:t>
+            </a:r>
+            <a:endParaRPr lang="en-US" altLang="ja-JP"/>
+          </a:p>
+        </p:txBody>
+      </p:sp>
+      <p:sp>
+        <p:nvSpPr>
+          <p:cNvPr id="5" name="Slide Number Placeholder 4"/>
+          <p:cNvSpPr>
+            <a:spLocks noGrp="1"/>
+          </p:cNvSpPr>
+          <p:nvPr>
+            <p:ph type="sldNum" sz="quarter" idx="11"/>
+          </p:nvPr>
+        </p:nvSpPr>
+        <p:spPr/>
+        <p:txBody>
+          <a:bodyPr/>
+          <a:lstStyle/>
+          <a:p>
+            <a:fld id="{87D0AC98-BE4D-4AA9-9598-A155CF901337}" type="slidenum">
+              <a:rPr lang="en-US" altLang="ja-JP" smtClean="0"/>
+              <a:pPr/>
+              <a:t>13</a:t>
+            </a:fld>
+            <a:endParaRPr lang="en-US" altLang="ja-JP"/>
+          </a:p>
+        </p:txBody>
+      </p:sp>
+      <p:pic>
+        <p:nvPicPr>
+          <p:cNvPr id="7" name="Content Placeholder 6"/>
+          <p:cNvPicPr>
+            <a:picLocks noGrp="1" noChangeAspect="1"/>
+          </p:cNvPicPr>
+          <p:nvPr>
+            <p:ph idx="1"/>
+          </p:nvPr>
+        </p:nvPicPr>
+        <p:blipFill rotWithShape="1">
+          <a:blip r:embed="rId2">
+            <a:extLst>
+              <a:ext uri="{28A0092B-C50C-407E-A947-70E740481C1C}">
+                <a14:useLocalDpi xmlns:a14="http://schemas.microsoft.com/office/drawing/2010/main" val="0"/>
+              </a:ext>
+            </a:extLst>
+          </a:blip>
+          <a:srcRect b="5096"/>
+          <a:stretch/>
+        </p:blipFill>
+        <p:spPr>
+          <a:xfrm>
+            <a:off x="774946" y="833730"/>
+            <a:ext cx="8266667" cy="5558690"/>
+          </a:xfrm>
+        </p:spPr>
+      </p:pic>
+    </p:spTree>
+    <p:extLst>
+      <p:ext uri="{BB962C8B-B14F-4D97-AF65-F5344CB8AC3E}">
+        <p14:creationId xmlns:p14="http://schemas.microsoft.com/office/powerpoint/2010/main" val="958711187"/>
+      </p:ext>
+    </p:extLst>
+  </p:cSld>
+  <p:clrMapOvr>
+    <a:masterClrMapping/>
+  </p:clrMapOvr>
+</p:sld>
+</file>
+
+<file path=ppt/slides/slide15.xml><?xml version="1.0" encoding="utf-8"?>
+<p:sld xmlns:a="http://schemas.openxmlformats.org/drawingml/2006/main" xmlns:r="http://schemas.openxmlformats.org/officeDocument/2006/relationships" xmlns:p="http://schemas.openxmlformats.org/presentationml/2006/main">
+  <p:cSld>
+    <p:spTree>
+      <p:nvGrpSpPr>
+        <p:cNvPr id="1" name=""/>
+        <p:cNvGrpSpPr/>
+        <p:nvPr/>
+      </p:nvGrpSpPr>
+      <p:grpSpPr>
+        <a:xfrm>
+          <a:off x="0" y="0"/>
+          <a:ext cx="0" cy="0"/>
+          <a:chOff x="0" y="0"/>
+          <a:chExt cx="0" cy="0"/>
+        </a:xfrm>
+      </p:grpSpPr>
+      <p:sp>
+        <p:nvSpPr>
+          <p:cNvPr id="2" name="Title 1"/>
+          <p:cNvSpPr>
+            <a:spLocks noGrp="1"/>
+          </p:cNvSpPr>
+          <p:nvPr>
+            <p:ph type="title"/>
+          </p:nvPr>
+        </p:nvSpPr>
+        <p:spPr/>
+        <p:txBody>
+          <a:bodyPr/>
+          <a:lstStyle/>
+          <a:p>
+            <a:r>
+              <a:rPr lang="en-US" dirty="0"/>
+              <a:t>Image after </a:t>
+            </a:r>
+            <a:r>
+              <a:rPr lang="en-US" dirty="0" err="1"/>
+              <a:t>binarization</a:t>
+            </a:r>
+            <a:r>
+              <a:rPr lang="en-US" dirty="0"/>
+              <a:t>. Window size 100 threshold </a:t>
+            </a:r>
+            <a:r>
+              <a:rPr lang="en-US" dirty="0" smtClean="0"/>
+              <a:t>0.9</a:t>
+            </a:r>
+            <a:endParaRPr lang="fi-FI" dirty="0"/>
+          </a:p>
+        </p:txBody>
+      </p:sp>
+      <p:pic>
+        <p:nvPicPr>
+          <p:cNvPr id="6" name="Content Placeholder 5"/>
+          <p:cNvPicPr>
+            <a:picLocks noGrp="1" noChangeAspect="1"/>
+          </p:cNvPicPr>
+          <p:nvPr>
+            <p:ph idx="1"/>
+          </p:nvPr>
+        </p:nvPicPr>
+        <p:blipFill rotWithShape="1">
+          <a:blip r:embed="rId2">
+            <a:extLst>
+              <a:ext uri="{28A0092B-C50C-407E-A947-70E740481C1C}">
+                <a14:useLocalDpi xmlns:a14="http://schemas.microsoft.com/office/drawing/2010/main" val="0"/>
+              </a:ext>
+            </a:extLst>
+          </a:blip>
+          <a:srcRect b="7431"/>
+          <a:stretch/>
+        </p:blipFill>
+        <p:spPr>
+          <a:xfrm>
+            <a:off x="774946" y="815457"/>
+            <a:ext cx="8266667" cy="5421855"/>
+          </a:xfrm>
+        </p:spPr>
+      </p:pic>
+      <p:sp>
+        <p:nvSpPr>
+          <p:cNvPr id="4" name="Footer Placeholder 3"/>
+          <p:cNvSpPr>
+            <a:spLocks noGrp="1"/>
+          </p:cNvSpPr>
+          <p:nvPr>
+            <p:ph type="ftr" sz="quarter" idx="10"/>
+          </p:nvPr>
+        </p:nvSpPr>
+        <p:spPr/>
+        <p:txBody>
+          <a:bodyPr/>
+          <a:lstStyle/>
+          <a:p>
+            <a:r>
+              <a:rPr lang="ja-JP" altLang="en-US" smtClean="0"/>
+              <a:t>研究室ゼミ</a:t>
+            </a:r>
+            <a:endParaRPr lang="en-US" altLang="ja-JP"/>
+          </a:p>
+        </p:txBody>
+      </p:sp>
+      <p:sp>
+        <p:nvSpPr>
+          <p:cNvPr id="5" name="Slide Number Placeholder 4"/>
+          <p:cNvSpPr>
+            <a:spLocks noGrp="1"/>
+          </p:cNvSpPr>
+          <p:nvPr>
+            <p:ph type="sldNum" sz="quarter" idx="11"/>
+          </p:nvPr>
+        </p:nvSpPr>
+        <p:spPr/>
+        <p:txBody>
+          <a:bodyPr/>
+          <a:lstStyle/>
+          <a:p>
+            <a:fld id="{87D0AC98-BE4D-4AA9-9598-A155CF901337}" type="slidenum">
+              <a:rPr lang="en-US" altLang="ja-JP" smtClean="0"/>
+              <a:pPr/>
+              <a:t>14</a:t>
+            </a:fld>
+            <a:endParaRPr lang="en-US" altLang="ja-JP"/>
+          </a:p>
+        </p:txBody>
+      </p:sp>
+    </p:spTree>
+    <p:extLst>
+      <p:ext uri="{BB962C8B-B14F-4D97-AF65-F5344CB8AC3E}">
+        <p14:creationId xmlns:p14="http://schemas.microsoft.com/office/powerpoint/2010/main" val="3867970758"/>
+      </p:ext>
+    </p:extLst>
+  </p:cSld>
+  <p:clrMapOvr>
+    <a:masterClrMapping/>
+  </p:clrMapOvr>
+</p:sld>
+</file>
+
+<file path=ppt/slides/slide16.xml><?xml version="1.0" encoding="utf-8"?>
+<p:sld xmlns:a="http://schemas.openxmlformats.org/drawingml/2006/main" xmlns:r="http://schemas.openxmlformats.org/officeDocument/2006/relationships" xmlns:p="http://schemas.openxmlformats.org/presentationml/2006/main">
+  <p:cSld>
+    <p:spTree>
+      <p:nvGrpSpPr>
+        <p:cNvPr id="1" name=""/>
+        <p:cNvGrpSpPr/>
+        <p:nvPr/>
+      </p:nvGrpSpPr>
+      <p:grpSpPr>
+        <a:xfrm>
+          <a:off x="0" y="0"/>
+          <a:ext cx="0" cy="0"/>
+          <a:chOff x="0" y="0"/>
+          <a:chExt cx="0" cy="0"/>
+        </a:xfrm>
+      </p:grpSpPr>
+      <p:sp>
+        <p:nvSpPr>
+          <p:cNvPr id="2" name="Title 1"/>
+          <p:cNvSpPr>
+            <a:spLocks noGrp="1"/>
+          </p:cNvSpPr>
+          <p:nvPr>
+            <p:ph type="title"/>
+          </p:nvPr>
+        </p:nvSpPr>
+        <p:spPr>
+          <a:xfrm>
+            <a:off x="273050" y="170984"/>
+            <a:ext cx="9270460" cy="523220"/>
+          </a:xfrm>
+        </p:spPr>
+        <p:txBody>
+          <a:bodyPr/>
+          <a:lstStyle/>
+          <a:p>
+            <a:r>
+              <a:rPr lang="fi-FI" dirty="0" smtClean="0"/>
+              <a:t>Property analysis</a:t>
+            </a:r>
+            <a:endParaRPr lang="fi-FI" dirty="0"/>
+          </a:p>
+        </p:txBody>
+      </p:sp>
+      <p:sp>
+        <p:nvSpPr>
+          <p:cNvPr id="3" name="Content Placeholder 2"/>
+          <p:cNvSpPr>
+            <a:spLocks noGrp="1"/>
+          </p:cNvSpPr>
+          <p:nvPr>
+            <p:ph idx="1"/>
+          </p:nvPr>
+        </p:nvSpPr>
+        <p:spPr/>
+        <p:txBody>
+          <a:bodyPr/>
+          <a:lstStyle/>
+          <a:p>
+            <a:r>
+              <a:rPr lang="fi-FI" dirty="0" smtClean="0"/>
+              <a:t>Usually some irrelevant objects still remain after binarization.</a:t>
+            </a:r>
+          </a:p>
+          <a:p>
+            <a:r>
+              <a:rPr lang="fi-FI" dirty="0" smtClean="0"/>
+              <a:t>Some object properties are analyzed and the objects are removed which have feature values outside the preferred values.</a:t>
+            </a:r>
+          </a:p>
+          <a:p>
+            <a:r>
+              <a:rPr lang="fi-FI" dirty="0" smtClean="0"/>
+              <a:t>Example object properties include area, major axis length and Euler number (</a:t>
+            </a:r>
+            <a:r>
+              <a:rPr lang="en-US" dirty="0" smtClean="0"/>
+              <a:t>Number </a:t>
+            </a:r>
+            <a:r>
+              <a:rPr lang="en-US" dirty="0"/>
+              <a:t>of objects in the region minus the </a:t>
+            </a:r>
+            <a:r>
+              <a:rPr lang="en-US" dirty="0" smtClean="0"/>
+              <a:t>number </a:t>
+            </a:r>
+            <a:r>
+              <a:rPr lang="en-US" dirty="0"/>
+              <a:t>of holes in those objects</a:t>
+            </a:r>
+            <a:r>
+              <a:rPr lang="fi-FI" dirty="0" smtClean="0"/>
+              <a:t>).</a:t>
+            </a:r>
+            <a:endParaRPr lang="fi-FI" dirty="0"/>
+          </a:p>
+        </p:txBody>
+      </p:sp>
+      <p:sp>
+        <p:nvSpPr>
+          <p:cNvPr id="4" name="Footer Placeholder 3"/>
+          <p:cNvSpPr>
+            <a:spLocks noGrp="1"/>
+          </p:cNvSpPr>
+          <p:nvPr>
+            <p:ph type="ftr" sz="quarter" idx="10"/>
+          </p:nvPr>
+        </p:nvSpPr>
+        <p:spPr/>
+        <p:txBody>
+          <a:bodyPr/>
+          <a:lstStyle/>
+          <a:p>
+            <a:r>
+              <a:rPr lang="ja-JP" altLang="en-US" smtClean="0"/>
+              <a:t>研究室ゼミ</a:t>
+            </a:r>
+            <a:endParaRPr lang="en-US" altLang="ja-JP"/>
+          </a:p>
+        </p:txBody>
+      </p:sp>
+      <p:sp>
+        <p:nvSpPr>
+          <p:cNvPr id="5" name="Slide Number Placeholder 4"/>
+          <p:cNvSpPr>
+            <a:spLocks noGrp="1"/>
+          </p:cNvSpPr>
+          <p:nvPr>
+            <p:ph type="sldNum" sz="quarter" idx="11"/>
+          </p:nvPr>
+        </p:nvSpPr>
+        <p:spPr/>
+        <p:txBody>
+          <a:bodyPr/>
+          <a:lstStyle/>
+          <a:p>
+            <a:fld id="{87D0AC98-BE4D-4AA9-9598-A155CF901337}" type="slidenum">
+              <a:rPr lang="en-US" altLang="ja-JP" smtClean="0"/>
+              <a:pPr/>
+              <a:t>15</a:t>
             </a:fld>
             <a:endParaRPr lang="en-US" altLang="ja-JP"/>
           </a:p>
@@ -7421,7 +8150,1552 @@
 </p:sld>
 </file>
 
-<file path=ppt/slides/slide13.xml><?xml version="1.0" encoding="utf-8"?>
+<file path=ppt/slides/slide17.xml><?xml version="1.0" encoding="utf-8"?>
+<p:sld xmlns:a="http://schemas.openxmlformats.org/drawingml/2006/main" xmlns:r="http://schemas.openxmlformats.org/officeDocument/2006/relationships" xmlns:p="http://schemas.openxmlformats.org/presentationml/2006/main">
+  <p:cSld>
+    <p:spTree>
+      <p:nvGrpSpPr>
+        <p:cNvPr id="1" name=""/>
+        <p:cNvGrpSpPr/>
+        <p:nvPr/>
+      </p:nvGrpSpPr>
+      <p:grpSpPr>
+        <a:xfrm>
+          <a:off x="0" y="0"/>
+          <a:ext cx="0" cy="0"/>
+          <a:chOff x="0" y="0"/>
+          <a:chExt cx="0" cy="0"/>
+        </a:xfrm>
+      </p:grpSpPr>
+      <p:sp>
+        <p:nvSpPr>
+          <p:cNvPr id="2" name="Title 1"/>
+          <p:cNvSpPr>
+            <a:spLocks noGrp="1"/>
+          </p:cNvSpPr>
+          <p:nvPr>
+            <p:ph type="title"/>
+          </p:nvPr>
+        </p:nvSpPr>
+        <p:spPr/>
+        <p:txBody>
+          <a:bodyPr/>
+          <a:lstStyle/>
+          <a:p>
+            <a:r>
+              <a:rPr lang="fi-FI" dirty="0" smtClean="0"/>
+              <a:t>Image after binarization. Window size 100 threshold 0.4</a:t>
+            </a:r>
+            <a:endParaRPr lang="fi-FI" dirty="0"/>
+          </a:p>
+        </p:txBody>
+      </p:sp>
+      <p:sp>
+        <p:nvSpPr>
+          <p:cNvPr id="4" name="Footer Placeholder 3"/>
+          <p:cNvSpPr>
+            <a:spLocks noGrp="1"/>
+          </p:cNvSpPr>
+          <p:nvPr>
+            <p:ph type="ftr" sz="quarter" idx="10"/>
+          </p:nvPr>
+        </p:nvSpPr>
+        <p:spPr/>
+        <p:txBody>
+          <a:bodyPr/>
+          <a:lstStyle/>
+          <a:p>
+            <a:r>
+              <a:rPr lang="ja-JP" altLang="en-US" smtClean="0"/>
+              <a:t>研究室ゼミ</a:t>
+            </a:r>
+            <a:endParaRPr lang="en-US" altLang="ja-JP"/>
+          </a:p>
+        </p:txBody>
+      </p:sp>
+      <p:sp>
+        <p:nvSpPr>
+          <p:cNvPr id="5" name="Slide Number Placeholder 4"/>
+          <p:cNvSpPr>
+            <a:spLocks noGrp="1"/>
+          </p:cNvSpPr>
+          <p:nvPr>
+            <p:ph type="sldNum" sz="quarter" idx="11"/>
+          </p:nvPr>
+        </p:nvSpPr>
+        <p:spPr/>
+        <p:txBody>
+          <a:bodyPr/>
+          <a:lstStyle/>
+          <a:p>
+            <a:fld id="{87D0AC98-BE4D-4AA9-9598-A155CF901337}" type="slidenum">
+              <a:rPr lang="en-US" altLang="ja-JP" smtClean="0"/>
+              <a:pPr/>
+              <a:t>16</a:t>
+            </a:fld>
+            <a:endParaRPr lang="en-US" altLang="ja-JP"/>
+          </a:p>
+        </p:txBody>
+      </p:sp>
+      <p:pic>
+        <p:nvPicPr>
+          <p:cNvPr id="7" name="Content Placeholder 6"/>
+          <p:cNvPicPr>
+            <a:picLocks noGrp="1" noChangeAspect="1"/>
+          </p:cNvPicPr>
+          <p:nvPr>
+            <p:ph idx="1"/>
+          </p:nvPr>
+        </p:nvPicPr>
+        <p:blipFill rotWithShape="1">
+          <a:blip r:embed="rId2">
+            <a:extLst>
+              <a:ext uri="{28A0092B-C50C-407E-A947-70E740481C1C}">
+                <a14:useLocalDpi xmlns:a14="http://schemas.microsoft.com/office/drawing/2010/main" val="0"/>
+              </a:ext>
+            </a:extLst>
+          </a:blip>
+          <a:srcRect b="5096"/>
+          <a:stretch/>
+        </p:blipFill>
+        <p:spPr>
+          <a:xfrm>
+            <a:off x="774946" y="833730"/>
+            <a:ext cx="8266667" cy="5558690"/>
+          </a:xfrm>
+        </p:spPr>
+      </p:pic>
+    </p:spTree>
+    <p:extLst>
+      <p:ext uri="{BB962C8B-B14F-4D97-AF65-F5344CB8AC3E}">
+        <p14:creationId xmlns:p14="http://schemas.microsoft.com/office/powerpoint/2010/main" val="825939187"/>
+      </p:ext>
+    </p:extLst>
+  </p:cSld>
+  <p:clrMapOvr>
+    <a:masterClrMapping/>
+  </p:clrMapOvr>
+</p:sld>
+</file>
+
+<file path=ppt/slides/slide18.xml><?xml version="1.0" encoding="utf-8"?>
+<p:sld xmlns:a="http://schemas.openxmlformats.org/drawingml/2006/main" xmlns:r="http://schemas.openxmlformats.org/officeDocument/2006/relationships" xmlns:p="http://schemas.openxmlformats.org/presentationml/2006/main">
+  <p:cSld>
+    <p:spTree>
+      <p:nvGrpSpPr>
+        <p:cNvPr id="1" name=""/>
+        <p:cNvGrpSpPr/>
+        <p:nvPr/>
+      </p:nvGrpSpPr>
+      <p:grpSpPr>
+        <a:xfrm>
+          <a:off x="0" y="0"/>
+          <a:ext cx="0" cy="0"/>
+          <a:chOff x="0" y="0"/>
+          <a:chExt cx="0" cy="0"/>
+        </a:xfrm>
+      </p:grpSpPr>
+      <p:sp>
+        <p:nvSpPr>
+          <p:cNvPr id="2" name="Title 1"/>
+          <p:cNvSpPr>
+            <a:spLocks noGrp="1"/>
+          </p:cNvSpPr>
+          <p:nvPr>
+            <p:ph type="title"/>
+          </p:nvPr>
+        </p:nvSpPr>
+        <p:spPr/>
+        <p:txBody>
+          <a:bodyPr/>
+          <a:lstStyle/>
+          <a:p>
+            <a:r>
+              <a:rPr lang="fi-FI" dirty="0" smtClean="0"/>
+              <a:t>Areas smaller than 200 pixels removed</a:t>
+            </a:r>
+            <a:endParaRPr lang="fi-FI" dirty="0"/>
+          </a:p>
+        </p:txBody>
+      </p:sp>
+      <p:sp>
+        <p:nvSpPr>
+          <p:cNvPr id="4" name="Footer Placeholder 3"/>
+          <p:cNvSpPr>
+            <a:spLocks noGrp="1"/>
+          </p:cNvSpPr>
+          <p:nvPr>
+            <p:ph type="ftr" sz="quarter" idx="10"/>
+          </p:nvPr>
+        </p:nvSpPr>
+        <p:spPr/>
+        <p:txBody>
+          <a:bodyPr/>
+          <a:lstStyle/>
+          <a:p>
+            <a:r>
+              <a:rPr lang="ja-JP" altLang="en-US" smtClean="0"/>
+              <a:t>研究室ゼミ</a:t>
+            </a:r>
+            <a:endParaRPr lang="en-US" altLang="ja-JP"/>
+          </a:p>
+        </p:txBody>
+      </p:sp>
+      <p:sp>
+        <p:nvSpPr>
+          <p:cNvPr id="5" name="Slide Number Placeholder 4"/>
+          <p:cNvSpPr>
+            <a:spLocks noGrp="1"/>
+          </p:cNvSpPr>
+          <p:nvPr>
+            <p:ph type="sldNum" sz="quarter" idx="11"/>
+          </p:nvPr>
+        </p:nvSpPr>
+        <p:spPr/>
+        <p:txBody>
+          <a:bodyPr/>
+          <a:lstStyle/>
+          <a:p>
+            <a:fld id="{87D0AC98-BE4D-4AA9-9598-A155CF901337}" type="slidenum">
+              <a:rPr lang="en-US" altLang="ja-JP" smtClean="0"/>
+              <a:pPr/>
+              <a:t>17</a:t>
+            </a:fld>
+            <a:endParaRPr lang="en-US" altLang="ja-JP"/>
+          </a:p>
+        </p:txBody>
+      </p:sp>
+      <p:pic>
+        <p:nvPicPr>
+          <p:cNvPr id="10" name="Content Placeholder 9"/>
+          <p:cNvPicPr>
+            <a:picLocks noGrp="1" noChangeAspect="1"/>
+          </p:cNvPicPr>
+          <p:nvPr>
+            <p:ph idx="1"/>
+          </p:nvPr>
+        </p:nvPicPr>
+        <p:blipFill rotWithShape="1">
+          <a:blip r:embed="rId2">
+            <a:extLst>
+              <a:ext uri="{28A0092B-C50C-407E-A947-70E740481C1C}">
+                <a14:useLocalDpi xmlns:a14="http://schemas.microsoft.com/office/drawing/2010/main" val="0"/>
+              </a:ext>
+            </a:extLst>
+          </a:blip>
+          <a:srcRect b="4973"/>
+          <a:stretch/>
+        </p:blipFill>
+        <p:spPr>
+          <a:xfrm>
+            <a:off x="774946" y="836712"/>
+            <a:ext cx="8266667" cy="5565871"/>
+          </a:xfrm>
+        </p:spPr>
+      </p:pic>
+    </p:spTree>
+    <p:extLst>
+      <p:ext uri="{BB962C8B-B14F-4D97-AF65-F5344CB8AC3E}">
+        <p14:creationId xmlns:p14="http://schemas.microsoft.com/office/powerpoint/2010/main" val="3937083353"/>
+      </p:ext>
+    </p:extLst>
+  </p:cSld>
+  <p:clrMapOvr>
+    <a:masterClrMapping/>
+  </p:clrMapOvr>
+</p:sld>
+</file>
+
+<file path=ppt/slides/slide19.xml><?xml version="1.0" encoding="utf-8"?>
+<p:sld xmlns:a="http://schemas.openxmlformats.org/drawingml/2006/main" xmlns:r="http://schemas.openxmlformats.org/officeDocument/2006/relationships" xmlns:p="http://schemas.openxmlformats.org/presentationml/2006/main">
+  <p:cSld>
+    <p:spTree>
+      <p:nvGrpSpPr>
+        <p:cNvPr id="1" name=""/>
+        <p:cNvGrpSpPr/>
+        <p:nvPr/>
+      </p:nvGrpSpPr>
+      <p:grpSpPr>
+        <a:xfrm>
+          <a:off x="0" y="0"/>
+          <a:ext cx="0" cy="0"/>
+          <a:chOff x="0" y="0"/>
+          <a:chExt cx="0" cy="0"/>
+        </a:xfrm>
+      </p:grpSpPr>
+      <p:sp>
+        <p:nvSpPr>
+          <p:cNvPr id="2" name="Title 1"/>
+          <p:cNvSpPr>
+            <a:spLocks noGrp="1"/>
+          </p:cNvSpPr>
+          <p:nvPr>
+            <p:ph type="title"/>
+          </p:nvPr>
+        </p:nvSpPr>
+        <p:spPr/>
+        <p:txBody>
+          <a:bodyPr/>
+          <a:lstStyle/>
+          <a:p>
+            <a:r>
+              <a:rPr lang="fi-FI" dirty="0" smtClean="0"/>
+              <a:t>Areas with Euler numbers smaller than -4 removed</a:t>
+            </a:r>
+            <a:endParaRPr lang="fi-FI" dirty="0"/>
+          </a:p>
+        </p:txBody>
+      </p:sp>
+      <p:sp>
+        <p:nvSpPr>
+          <p:cNvPr id="4" name="Footer Placeholder 3"/>
+          <p:cNvSpPr>
+            <a:spLocks noGrp="1"/>
+          </p:cNvSpPr>
+          <p:nvPr>
+            <p:ph type="ftr" sz="quarter" idx="10"/>
+          </p:nvPr>
+        </p:nvSpPr>
+        <p:spPr/>
+        <p:txBody>
+          <a:bodyPr/>
+          <a:lstStyle/>
+          <a:p>
+            <a:r>
+              <a:rPr lang="ja-JP" altLang="en-US" smtClean="0"/>
+              <a:t>研究室ゼミ</a:t>
+            </a:r>
+            <a:endParaRPr lang="en-US" altLang="ja-JP"/>
+          </a:p>
+        </p:txBody>
+      </p:sp>
+      <p:sp>
+        <p:nvSpPr>
+          <p:cNvPr id="5" name="Slide Number Placeholder 4"/>
+          <p:cNvSpPr>
+            <a:spLocks noGrp="1"/>
+          </p:cNvSpPr>
+          <p:nvPr>
+            <p:ph type="sldNum" sz="quarter" idx="11"/>
+          </p:nvPr>
+        </p:nvSpPr>
+        <p:spPr/>
+        <p:txBody>
+          <a:bodyPr/>
+          <a:lstStyle/>
+          <a:p>
+            <a:fld id="{87D0AC98-BE4D-4AA9-9598-A155CF901337}" type="slidenum">
+              <a:rPr lang="en-US" altLang="ja-JP" smtClean="0"/>
+              <a:pPr/>
+              <a:t>18</a:t>
+            </a:fld>
+            <a:endParaRPr lang="en-US" altLang="ja-JP"/>
+          </a:p>
+        </p:txBody>
+      </p:sp>
+      <p:pic>
+        <p:nvPicPr>
+          <p:cNvPr id="10" name="Content Placeholder 9"/>
+          <p:cNvPicPr>
+            <a:picLocks noGrp="1" noChangeAspect="1"/>
+          </p:cNvPicPr>
+          <p:nvPr>
+            <p:ph idx="1"/>
+          </p:nvPr>
+        </p:nvPicPr>
+        <p:blipFill rotWithShape="1">
+          <a:blip r:embed="rId2">
+            <a:extLst>
+              <a:ext uri="{28A0092B-C50C-407E-A947-70E740481C1C}">
+                <a14:useLocalDpi xmlns:a14="http://schemas.microsoft.com/office/drawing/2010/main" val="0"/>
+              </a:ext>
+            </a:extLst>
+          </a:blip>
+          <a:srcRect l="63" t="-11" r="-63" b="7794"/>
+          <a:stretch/>
+        </p:blipFill>
+        <p:spPr>
+          <a:xfrm>
+            <a:off x="774946" y="836712"/>
+            <a:ext cx="8266667" cy="5401272"/>
+          </a:xfrm>
+        </p:spPr>
+      </p:pic>
+    </p:spTree>
+    <p:extLst>
+      <p:ext uri="{BB962C8B-B14F-4D97-AF65-F5344CB8AC3E}">
+        <p14:creationId xmlns:p14="http://schemas.microsoft.com/office/powerpoint/2010/main" val="434231238"/>
+      </p:ext>
+    </p:extLst>
+  </p:cSld>
+  <p:clrMapOvr>
+    <a:masterClrMapping/>
+  </p:clrMapOvr>
+</p:sld>
+</file>
+
+<file path=ppt/slides/slide2.xml><?xml version="1.0" encoding="utf-8"?>
+<p:sld xmlns:a="http://schemas.openxmlformats.org/drawingml/2006/main" xmlns:r="http://schemas.openxmlformats.org/officeDocument/2006/relationships" xmlns:p="http://schemas.openxmlformats.org/presentationml/2006/main">
+  <p:cSld>
+    <p:spTree>
+      <p:nvGrpSpPr>
+        <p:cNvPr id="1" name=""/>
+        <p:cNvGrpSpPr/>
+        <p:nvPr/>
+      </p:nvGrpSpPr>
+      <p:grpSpPr>
+        <a:xfrm>
+          <a:off x="0" y="0"/>
+          <a:ext cx="0" cy="0"/>
+          <a:chOff x="0" y="0"/>
+          <a:chExt cx="0" cy="0"/>
+        </a:xfrm>
+      </p:grpSpPr>
+      <p:sp>
+        <p:nvSpPr>
+          <p:cNvPr id="2" name="タイトル 1"/>
+          <p:cNvSpPr>
+            <a:spLocks noGrp="1"/>
+          </p:cNvSpPr>
+          <p:nvPr>
+            <p:ph type="title"/>
+          </p:nvPr>
+        </p:nvSpPr>
+        <p:spPr/>
+        <p:txBody>
+          <a:bodyPr/>
+          <a:lstStyle/>
+          <a:p>
+            <a:r>
+              <a:rPr lang="fi-FI" altLang="ja-JP" dirty="0" smtClean="0"/>
+              <a:t>Overview</a:t>
+            </a:r>
+            <a:endParaRPr kumimoji="1" lang="ja-JP" altLang="en-US" dirty="0"/>
+          </a:p>
+        </p:txBody>
+      </p:sp>
+      <p:sp>
+        <p:nvSpPr>
+          <p:cNvPr id="3" name="コンテンツ プレースホルダー 2"/>
+          <p:cNvSpPr>
+            <a:spLocks noGrp="1"/>
+          </p:cNvSpPr>
+          <p:nvPr>
+            <p:ph idx="1"/>
+          </p:nvPr>
+        </p:nvSpPr>
+        <p:spPr/>
+        <p:txBody>
+          <a:bodyPr/>
+          <a:lstStyle/>
+          <a:p>
+            <a:r>
+              <a:rPr lang="fi-FI" altLang="ja-JP" dirty="0" smtClean="0"/>
+              <a:t>Introduction</a:t>
+            </a:r>
+          </a:p>
+          <a:p>
+            <a:r>
+              <a:rPr lang="fi-FI" altLang="ja-JP" dirty="0" smtClean="0"/>
+              <a:t>Handwriting recognition</a:t>
+            </a:r>
+          </a:p>
+          <a:p>
+            <a:r>
+              <a:rPr lang="fi-FI" altLang="ja-JP" dirty="0" smtClean="0"/>
+              <a:t>Preprocessing</a:t>
+            </a:r>
+          </a:p>
+          <a:p>
+            <a:pPr lvl="1"/>
+            <a:r>
+              <a:rPr lang="fi-FI" altLang="ja-JP" dirty="0" smtClean="0"/>
+              <a:t>Binarization</a:t>
+            </a:r>
+          </a:p>
+          <a:p>
+            <a:pPr lvl="1"/>
+            <a:r>
+              <a:rPr lang="fi-FI" altLang="ja-JP" dirty="0" smtClean="0"/>
+              <a:t>Sauvola algorithm</a:t>
+            </a:r>
+          </a:p>
+          <a:p>
+            <a:pPr lvl="1"/>
+            <a:r>
+              <a:rPr lang="fi-FI" altLang="ja-JP" dirty="0" smtClean="0"/>
+              <a:t>Property analysis</a:t>
+            </a:r>
+          </a:p>
+          <a:p>
+            <a:r>
+              <a:rPr lang="fi-FI" altLang="ja-JP" dirty="0" smtClean="0"/>
+              <a:t>Conclusions</a:t>
+            </a:r>
+          </a:p>
+          <a:p>
+            <a:r>
+              <a:rPr lang="fi-FI" altLang="ja-JP" dirty="0" smtClean="0"/>
+              <a:t>Future work</a:t>
+            </a:r>
+          </a:p>
+          <a:p>
+            <a:pPr marL="457200" lvl="1" indent="0">
+              <a:buNone/>
+            </a:pPr>
+            <a:endParaRPr lang="fi-FI" altLang="ja-JP" dirty="0" smtClean="0"/>
+          </a:p>
+          <a:p>
+            <a:endParaRPr lang="en-US" altLang="ja-JP" dirty="0" smtClean="0"/>
+          </a:p>
+          <a:p>
+            <a:pPr lvl="1"/>
+            <a:endParaRPr lang="en-US" altLang="ja-JP" dirty="0" smtClean="0"/>
+          </a:p>
+          <a:p>
+            <a:pPr lvl="1"/>
+            <a:endParaRPr lang="en-US" altLang="ja-JP" dirty="0" smtClean="0"/>
+          </a:p>
+          <a:p>
+            <a:pPr lvl="1"/>
+            <a:endParaRPr kumimoji="1" lang="en-US" altLang="ja-JP" dirty="0" smtClean="0"/>
+          </a:p>
+          <a:p>
+            <a:pPr lvl="1"/>
+            <a:endParaRPr kumimoji="1" lang="en-US" altLang="ja-JP" dirty="0" smtClean="0"/>
+          </a:p>
+          <a:p>
+            <a:pPr lvl="1"/>
+            <a:endParaRPr kumimoji="1" lang="ja-JP" altLang="en-US" dirty="0"/>
+          </a:p>
+        </p:txBody>
+      </p:sp>
+      <p:sp>
+        <p:nvSpPr>
+          <p:cNvPr id="5" name="フッター プレースホルダー 4"/>
+          <p:cNvSpPr>
+            <a:spLocks noGrp="1"/>
+          </p:cNvSpPr>
+          <p:nvPr>
+            <p:ph type="ftr" sz="quarter" idx="10"/>
+          </p:nvPr>
+        </p:nvSpPr>
+        <p:spPr/>
+        <p:txBody>
+          <a:bodyPr/>
+          <a:lstStyle/>
+          <a:p>
+            <a:r>
+              <a:rPr lang="ja-JP" altLang="en-US" smtClean="0"/>
+              <a:t>研究室ゼミ</a:t>
+            </a:r>
+            <a:endParaRPr lang="en-US" altLang="ja-JP"/>
+          </a:p>
+        </p:txBody>
+      </p:sp>
+      <p:sp>
+        <p:nvSpPr>
+          <p:cNvPr id="6" name="スライド番号プレースホルダー 5"/>
+          <p:cNvSpPr>
+            <a:spLocks noGrp="1"/>
+          </p:cNvSpPr>
+          <p:nvPr>
+            <p:ph type="sldNum" sz="quarter" idx="11"/>
+          </p:nvPr>
+        </p:nvSpPr>
+        <p:spPr/>
+        <p:txBody>
+          <a:bodyPr/>
+          <a:lstStyle/>
+          <a:p>
+            <a:fld id="{87D0AC98-BE4D-4AA9-9598-A155CF901337}" type="slidenum">
+              <a:rPr lang="en-US" altLang="ja-JP" smtClean="0"/>
+              <a:pPr/>
+              <a:t>1</a:t>
+            </a:fld>
+            <a:endParaRPr lang="en-US" altLang="ja-JP"/>
+          </a:p>
+        </p:txBody>
+      </p:sp>
+    </p:spTree>
+    <p:extLst>
+      <p:ext uri="{BB962C8B-B14F-4D97-AF65-F5344CB8AC3E}">
+        <p14:creationId xmlns:p14="http://schemas.microsoft.com/office/powerpoint/2010/main" val="1174836993"/>
+      </p:ext>
+    </p:extLst>
+  </p:cSld>
+  <p:clrMapOvr>
+    <a:masterClrMapping/>
+  </p:clrMapOvr>
+  <p:timing>
+    <p:tnLst>
+      <p:par>
+        <p:cTn id="1" dur="indefinite" restart="never" nodeType="tmRoot"/>
+      </p:par>
+    </p:tnLst>
+  </p:timing>
+</p:sld>
+</file>
+
+<file path=ppt/slides/slide20.xml><?xml version="1.0" encoding="utf-8"?>
+<p:sld xmlns:a="http://schemas.openxmlformats.org/drawingml/2006/main" xmlns:r="http://schemas.openxmlformats.org/officeDocument/2006/relationships" xmlns:p="http://schemas.openxmlformats.org/presentationml/2006/main">
+  <p:cSld>
+    <p:spTree>
+      <p:nvGrpSpPr>
+        <p:cNvPr id="1" name=""/>
+        <p:cNvGrpSpPr/>
+        <p:nvPr/>
+      </p:nvGrpSpPr>
+      <p:grpSpPr>
+        <a:xfrm>
+          <a:off x="0" y="0"/>
+          <a:ext cx="0" cy="0"/>
+          <a:chOff x="0" y="0"/>
+          <a:chExt cx="0" cy="0"/>
+        </a:xfrm>
+      </p:grpSpPr>
+      <p:sp>
+        <p:nvSpPr>
+          <p:cNvPr id="2" name="Title 1"/>
+          <p:cNvSpPr>
+            <a:spLocks noGrp="1"/>
+          </p:cNvSpPr>
+          <p:nvPr>
+            <p:ph type="title"/>
+          </p:nvPr>
+        </p:nvSpPr>
+        <p:spPr/>
+        <p:txBody>
+          <a:bodyPr/>
+          <a:lstStyle/>
+          <a:p>
+            <a:r>
+              <a:rPr lang="fi-FI" dirty="0" smtClean="0"/>
+              <a:t>Found objects (Some irrelevant objects remain)</a:t>
+            </a:r>
+            <a:endParaRPr lang="fi-FI" dirty="0"/>
+          </a:p>
+        </p:txBody>
+      </p:sp>
+      <p:sp>
+        <p:nvSpPr>
+          <p:cNvPr id="4" name="Footer Placeholder 3"/>
+          <p:cNvSpPr>
+            <a:spLocks noGrp="1"/>
+          </p:cNvSpPr>
+          <p:nvPr>
+            <p:ph type="ftr" sz="quarter" idx="10"/>
+          </p:nvPr>
+        </p:nvSpPr>
+        <p:spPr/>
+        <p:txBody>
+          <a:bodyPr/>
+          <a:lstStyle/>
+          <a:p>
+            <a:r>
+              <a:rPr lang="ja-JP" altLang="en-US" smtClean="0"/>
+              <a:t>研究室ゼミ</a:t>
+            </a:r>
+            <a:endParaRPr lang="en-US" altLang="ja-JP"/>
+          </a:p>
+        </p:txBody>
+      </p:sp>
+      <p:sp>
+        <p:nvSpPr>
+          <p:cNvPr id="5" name="Slide Number Placeholder 4"/>
+          <p:cNvSpPr>
+            <a:spLocks noGrp="1"/>
+          </p:cNvSpPr>
+          <p:nvPr>
+            <p:ph type="sldNum" sz="quarter" idx="11"/>
+          </p:nvPr>
+        </p:nvSpPr>
+        <p:spPr/>
+        <p:txBody>
+          <a:bodyPr/>
+          <a:lstStyle/>
+          <a:p>
+            <a:fld id="{87D0AC98-BE4D-4AA9-9598-A155CF901337}" type="slidenum">
+              <a:rPr lang="en-US" altLang="ja-JP" smtClean="0"/>
+              <a:pPr/>
+              <a:t>19</a:t>
+            </a:fld>
+            <a:endParaRPr lang="en-US" altLang="ja-JP"/>
+          </a:p>
+        </p:txBody>
+      </p:sp>
+      <p:pic>
+        <p:nvPicPr>
+          <p:cNvPr id="8" name="Content Placeholder 7"/>
+          <p:cNvPicPr>
+            <a:picLocks noGrp="1" noChangeAspect="1"/>
+          </p:cNvPicPr>
+          <p:nvPr>
+            <p:ph idx="1"/>
+          </p:nvPr>
+        </p:nvPicPr>
+        <p:blipFill rotWithShape="1">
+          <a:blip r:embed="rId2">
+            <a:extLst>
+              <a:ext uri="{28A0092B-C50C-407E-A947-70E740481C1C}">
+                <a14:useLocalDpi xmlns:a14="http://schemas.microsoft.com/office/drawing/2010/main" val="0"/>
+              </a:ext>
+            </a:extLst>
+          </a:blip>
+          <a:srcRect t="3286" b="8197"/>
+          <a:stretch/>
+        </p:blipFill>
+        <p:spPr>
+          <a:xfrm>
+            <a:off x="774946" y="1020787"/>
+            <a:ext cx="8266667" cy="5184576"/>
+          </a:xfrm>
+        </p:spPr>
+      </p:pic>
+    </p:spTree>
+    <p:extLst>
+      <p:ext uri="{BB962C8B-B14F-4D97-AF65-F5344CB8AC3E}">
+        <p14:creationId xmlns:p14="http://schemas.microsoft.com/office/powerpoint/2010/main" val="4229889053"/>
+      </p:ext>
+    </p:extLst>
+  </p:cSld>
+  <p:clrMapOvr>
+    <a:masterClrMapping/>
+  </p:clrMapOvr>
+</p:sld>
+</file>
+
+<file path=ppt/slides/slide21.xml><?xml version="1.0" encoding="utf-8"?>
+<p:sld xmlns:a="http://schemas.openxmlformats.org/drawingml/2006/main" xmlns:r="http://schemas.openxmlformats.org/officeDocument/2006/relationships" xmlns:p="http://schemas.openxmlformats.org/presentationml/2006/main">
+  <p:cSld>
+    <p:spTree>
+      <p:nvGrpSpPr>
+        <p:cNvPr id="1" name=""/>
+        <p:cNvGrpSpPr/>
+        <p:nvPr/>
+      </p:nvGrpSpPr>
+      <p:grpSpPr>
+        <a:xfrm>
+          <a:off x="0" y="0"/>
+          <a:ext cx="0" cy="0"/>
+          <a:chOff x="0" y="0"/>
+          <a:chExt cx="0" cy="0"/>
+        </a:xfrm>
+      </p:grpSpPr>
+      <p:sp>
+        <p:nvSpPr>
+          <p:cNvPr id="2" name="Title 1"/>
+          <p:cNvSpPr>
+            <a:spLocks noGrp="1"/>
+          </p:cNvSpPr>
+          <p:nvPr>
+            <p:ph type="title"/>
+          </p:nvPr>
+        </p:nvSpPr>
+        <p:spPr/>
+        <p:txBody>
+          <a:bodyPr/>
+          <a:lstStyle/>
+          <a:p>
+            <a:r>
+              <a:rPr lang="fi-FI" dirty="0" smtClean="0"/>
+              <a:t>Errors with different image and same parameters</a:t>
+            </a:r>
+            <a:endParaRPr lang="fi-FI" dirty="0"/>
+          </a:p>
+        </p:txBody>
+      </p:sp>
+      <p:pic>
+        <p:nvPicPr>
+          <p:cNvPr id="6" name="Content Placeholder 5"/>
+          <p:cNvPicPr>
+            <a:picLocks noGrp="1" noChangeAspect="1"/>
+          </p:cNvPicPr>
+          <p:nvPr>
+            <p:ph idx="1"/>
+          </p:nvPr>
+        </p:nvPicPr>
+        <p:blipFill>
+          <a:blip r:embed="rId2" cstate="print">
+            <a:extLst>
+              <a:ext uri="{28A0092B-C50C-407E-A947-70E740481C1C}">
+                <a14:useLocalDpi xmlns:a14="http://schemas.microsoft.com/office/drawing/2010/main" val="0"/>
+              </a:ext>
+            </a:extLst>
+          </a:blip>
+          <a:stretch>
+            <a:fillRect/>
+          </a:stretch>
+        </p:blipFill>
+        <p:spPr>
+          <a:xfrm>
+            <a:off x="1256768" y="929489"/>
+            <a:ext cx="7296632" cy="2207904"/>
+          </a:xfrm>
+        </p:spPr>
+      </p:pic>
+      <p:sp>
+        <p:nvSpPr>
+          <p:cNvPr id="4" name="Footer Placeholder 3"/>
+          <p:cNvSpPr>
+            <a:spLocks noGrp="1"/>
+          </p:cNvSpPr>
+          <p:nvPr>
+            <p:ph type="ftr" sz="quarter" idx="10"/>
+          </p:nvPr>
+        </p:nvSpPr>
+        <p:spPr/>
+        <p:txBody>
+          <a:bodyPr/>
+          <a:lstStyle/>
+          <a:p>
+            <a:r>
+              <a:rPr lang="ja-JP" altLang="en-US" smtClean="0"/>
+              <a:t>研究室ゼミ</a:t>
+            </a:r>
+            <a:endParaRPr lang="en-US" altLang="ja-JP"/>
+          </a:p>
+        </p:txBody>
+      </p:sp>
+      <p:sp>
+        <p:nvSpPr>
+          <p:cNvPr id="5" name="Slide Number Placeholder 4"/>
+          <p:cNvSpPr>
+            <a:spLocks noGrp="1"/>
+          </p:cNvSpPr>
+          <p:nvPr>
+            <p:ph type="sldNum" sz="quarter" idx="11"/>
+          </p:nvPr>
+        </p:nvSpPr>
+        <p:spPr/>
+        <p:txBody>
+          <a:bodyPr/>
+          <a:lstStyle/>
+          <a:p>
+            <a:fld id="{87D0AC98-BE4D-4AA9-9598-A155CF901337}" type="slidenum">
+              <a:rPr lang="en-US" altLang="ja-JP" smtClean="0"/>
+              <a:pPr/>
+              <a:t>20</a:t>
+            </a:fld>
+            <a:endParaRPr lang="en-US" altLang="ja-JP"/>
+          </a:p>
+        </p:txBody>
+      </p:sp>
+      <p:pic>
+        <p:nvPicPr>
+          <p:cNvPr id="7" name="Picture 6"/>
+          <p:cNvPicPr>
+            <a:picLocks noChangeAspect="1"/>
+          </p:cNvPicPr>
+          <p:nvPr/>
+        </p:nvPicPr>
+        <p:blipFill rotWithShape="1">
+          <a:blip r:embed="rId3">
+            <a:extLst>
+              <a:ext uri="{28A0092B-C50C-407E-A947-70E740481C1C}">
+                <a14:useLocalDpi xmlns:a14="http://schemas.microsoft.com/office/drawing/2010/main" val="0"/>
+              </a:ext>
+            </a:extLst>
+          </a:blip>
+          <a:srcRect l="7624" t="4054" r="5751" b="14864"/>
+          <a:stretch/>
+        </p:blipFill>
+        <p:spPr>
+          <a:xfrm>
+            <a:off x="1256768" y="3164316"/>
+            <a:ext cx="7460570" cy="2387382"/>
+          </a:xfrm>
+          <a:prstGeom prst="rect">
+            <a:avLst/>
+          </a:prstGeom>
+        </p:spPr>
+      </p:pic>
+      <p:sp>
+        <p:nvSpPr>
+          <p:cNvPr id="8" name="TextBox 7"/>
+          <p:cNvSpPr txBox="1"/>
+          <p:nvPr/>
+        </p:nvSpPr>
+        <p:spPr>
+          <a:xfrm>
+            <a:off x="751760" y="5545444"/>
+            <a:ext cx="8470588" cy="830997"/>
+          </a:xfrm>
+          <a:prstGeom prst="rect">
+            <a:avLst/>
+          </a:prstGeom>
+          <a:noFill/>
+        </p:spPr>
+        <p:txBody>
+          <a:bodyPr wrap="none" rtlCol="0">
+            <a:spAutoFit/>
+          </a:bodyPr>
+          <a:lstStyle/>
+          <a:p>
+            <a:pPr algn="ctr"/>
+            <a:r>
+              <a:rPr kumimoji="1" lang="fi-FI" sz="2400" dirty="0" smtClean="0">
+                <a:latin typeface="+mn-lt"/>
+              </a:rPr>
+              <a:t>(Lighter pen caused more holes in objects </a:t>
+            </a:r>
+          </a:p>
+          <a:p>
+            <a:pPr algn="ctr"/>
+            <a:r>
+              <a:rPr kumimoji="1" lang="fi-FI" sz="2400" dirty="0" smtClean="0">
+                <a:latin typeface="+mn-lt"/>
+              </a:rPr>
+              <a:t>which then caused Euler number to be lower than expected.)</a:t>
+            </a:r>
+            <a:endParaRPr kumimoji="1" lang="fi-FI" sz="2400" dirty="0">
+              <a:latin typeface="+mn-lt"/>
+            </a:endParaRPr>
+          </a:p>
+        </p:txBody>
+      </p:sp>
+    </p:spTree>
+    <p:extLst>
+      <p:ext uri="{BB962C8B-B14F-4D97-AF65-F5344CB8AC3E}">
+        <p14:creationId xmlns:p14="http://schemas.microsoft.com/office/powerpoint/2010/main" val="2723525102"/>
+      </p:ext>
+    </p:extLst>
+  </p:cSld>
+  <p:clrMapOvr>
+    <a:masterClrMapping/>
+  </p:clrMapOvr>
+  <p:timing>
+    <p:tnLst>
+      <p:par>
+        <p:cTn id="1" dur="indefinite" restart="never" nodeType="tmRoot"/>
+      </p:par>
+    </p:tnLst>
+  </p:timing>
+</p:sld>
+</file>
+
+<file path=ppt/slides/slide22.xml><?xml version="1.0" encoding="utf-8"?>
+<p:sld xmlns:a="http://schemas.openxmlformats.org/drawingml/2006/main" xmlns:r="http://schemas.openxmlformats.org/officeDocument/2006/relationships" xmlns:p="http://schemas.openxmlformats.org/presentationml/2006/main">
+  <p:cSld>
+    <p:spTree>
+      <p:nvGrpSpPr>
+        <p:cNvPr id="1" name=""/>
+        <p:cNvGrpSpPr/>
+        <p:nvPr/>
+      </p:nvGrpSpPr>
+      <p:grpSpPr>
+        <a:xfrm>
+          <a:off x="0" y="0"/>
+          <a:ext cx="0" cy="0"/>
+          <a:chOff x="0" y="0"/>
+          <a:chExt cx="0" cy="0"/>
+        </a:xfrm>
+      </p:grpSpPr>
+      <p:sp>
+        <p:nvSpPr>
+          <p:cNvPr id="2" name="Title 1"/>
+          <p:cNvSpPr>
+            <a:spLocks noGrp="1"/>
+          </p:cNvSpPr>
+          <p:nvPr>
+            <p:ph type="title"/>
+          </p:nvPr>
+        </p:nvSpPr>
+        <p:spPr/>
+        <p:txBody>
+          <a:bodyPr/>
+          <a:lstStyle/>
+          <a:p>
+            <a:r>
+              <a:rPr lang="fi-FI" dirty="0" smtClean="0"/>
+              <a:t>Conclusions</a:t>
+            </a:r>
+            <a:endParaRPr lang="fi-FI" dirty="0"/>
+          </a:p>
+        </p:txBody>
+      </p:sp>
+      <p:sp>
+        <p:nvSpPr>
+          <p:cNvPr id="3" name="Content Placeholder 2"/>
+          <p:cNvSpPr>
+            <a:spLocks noGrp="1"/>
+          </p:cNvSpPr>
+          <p:nvPr>
+            <p:ph idx="1"/>
+          </p:nvPr>
+        </p:nvSpPr>
+        <p:spPr/>
+        <p:txBody>
+          <a:bodyPr/>
+          <a:lstStyle/>
+          <a:p>
+            <a:r>
+              <a:rPr lang="fi-FI" dirty="0" smtClean="0"/>
+              <a:t>Chosen methods are useful in preprocessing.</a:t>
+            </a:r>
+          </a:p>
+          <a:p>
+            <a:r>
+              <a:rPr lang="fi-FI" dirty="0" smtClean="0"/>
+              <a:t>Chosen arguments will </a:t>
+            </a:r>
+            <a:r>
+              <a:rPr lang="fi-FI" dirty="0"/>
+              <a:t>work only for the specific </a:t>
+            </a:r>
+            <a:r>
+              <a:rPr lang="fi-FI" dirty="0" smtClean="0"/>
+              <a:t>case.</a:t>
+            </a:r>
+          </a:p>
+          <a:p>
+            <a:r>
+              <a:rPr lang="fi-FI" dirty="0" smtClean="0"/>
+              <a:t>Problems:</a:t>
+            </a:r>
+            <a:endParaRPr lang="fi-FI" dirty="0"/>
+          </a:p>
+          <a:p>
+            <a:pPr lvl="1"/>
+            <a:r>
+              <a:rPr lang="fi-FI" dirty="0"/>
+              <a:t>Human handwriting can vary a lot even with same </a:t>
+            </a:r>
+            <a:r>
+              <a:rPr lang="fi-FI" dirty="0" smtClean="0"/>
+              <a:t>person. </a:t>
+            </a:r>
+          </a:p>
+          <a:p>
+            <a:pPr lvl="1"/>
+            <a:r>
+              <a:rPr lang="fi-FI" dirty="0" smtClean="0"/>
+              <a:t>Different size and thickness with letters.</a:t>
+            </a:r>
+          </a:p>
+          <a:p>
+            <a:pPr lvl="1"/>
+            <a:r>
+              <a:rPr lang="fi-FI" dirty="0" smtClean="0"/>
+              <a:t>Different color pens or pencils.</a:t>
+            </a:r>
+          </a:p>
+          <a:p>
+            <a:pPr lvl="1"/>
+            <a:r>
+              <a:rPr lang="fi-FI" dirty="0" smtClean="0"/>
+              <a:t>Differing image resolutions.</a:t>
+            </a:r>
+          </a:p>
+          <a:p>
+            <a:r>
+              <a:rPr lang="fi-FI" dirty="0" smtClean="0"/>
+              <a:t>Solutions:</a:t>
+            </a:r>
+          </a:p>
+          <a:p>
+            <a:pPr lvl="1"/>
+            <a:r>
+              <a:rPr lang="fi-FI" dirty="0" smtClean="0"/>
+              <a:t>Keep resolution as constant.</a:t>
+            </a:r>
+          </a:p>
+          <a:p>
+            <a:pPr lvl="1"/>
+            <a:r>
+              <a:rPr lang="fi-FI" dirty="0" smtClean="0"/>
+              <a:t>Try to find optimal stroke width without prior information.</a:t>
+            </a:r>
+          </a:p>
+          <a:p>
+            <a:pPr lvl="1"/>
+            <a:r>
+              <a:rPr lang="fi-FI" dirty="0" smtClean="0"/>
+              <a:t>Apply morphological closing to remove small holes.</a:t>
+            </a:r>
+          </a:p>
+          <a:p>
+            <a:pPr marL="457200" lvl="1" indent="0">
+              <a:buNone/>
+            </a:pPr>
+            <a:endParaRPr lang="fi-FI" dirty="0"/>
+          </a:p>
+          <a:p>
+            <a:endParaRPr lang="fi-FI" dirty="0"/>
+          </a:p>
+        </p:txBody>
+      </p:sp>
+      <p:sp>
+        <p:nvSpPr>
+          <p:cNvPr id="4" name="Footer Placeholder 3"/>
+          <p:cNvSpPr>
+            <a:spLocks noGrp="1"/>
+          </p:cNvSpPr>
+          <p:nvPr>
+            <p:ph type="ftr" sz="quarter" idx="10"/>
+          </p:nvPr>
+        </p:nvSpPr>
+        <p:spPr/>
+        <p:txBody>
+          <a:bodyPr/>
+          <a:lstStyle/>
+          <a:p>
+            <a:r>
+              <a:rPr lang="ja-JP" altLang="en-US" smtClean="0"/>
+              <a:t>研究室ゼミ</a:t>
+            </a:r>
+            <a:endParaRPr lang="en-US" altLang="ja-JP"/>
+          </a:p>
+        </p:txBody>
+      </p:sp>
+      <p:sp>
+        <p:nvSpPr>
+          <p:cNvPr id="5" name="Slide Number Placeholder 4"/>
+          <p:cNvSpPr>
+            <a:spLocks noGrp="1"/>
+          </p:cNvSpPr>
+          <p:nvPr>
+            <p:ph type="sldNum" sz="quarter" idx="11"/>
+          </p:nvPr>
+        </p:nvSpPr>
+        <p:spPr/>
+        <p:txBody>
+          <a:bodyPr/>
+          <a:lstStyle/>
+          <a:p>
+            <a:fld id="{87D0AC98-BE4D-4AA9-9598-A155CF901337}" type="slidenum">
+              <a:rPr lang="en-US" altLang="ja-JP" smtClean="0"/>
+              <a:pPr/>
+              <a:t>21</a:t>
+            </a:fld>
+            <a:endParaRPr lang="en-US" altLang="ja-JP"/>
+          </a:p>
+        </p:txBody>
+      </p:sp>
+    </p:spTree>
+    <p:extLst>
+      <p:ext uri="{BB962C8B-B14F-4D97-AF65-F5344CB8AC3E}">
+        <p14:creationId xmlns:p14="http://schemas.microsoft.com/office/powerpoint/2010/main" val="2375643434"/>
+      </p:ext>
+    </p:extLst>
+  </p:cSld>
+  <p:clrMapOvr>
+    <a:masterClrMapping/>
+  </p:clrMapOvr>
+  <p:timing>
+    <p:tnLst>
+      <p:par>
+        <p:cTn id="1" dur="indefinite" restart="never" nodeType="tmRoot"/>
+      </p:par>
+    </p:tnLst>
+  </p:timing>
+</p:sld>
+</file>
+
+<file path=ppt/slides/slide23.xml><?xml version="1.0" encoding="utf-8"?>
+<p:sld xmlns:a="http://schemas.openxmlformats.org/drawingml/2006/main" xmlns:r="http://schemas.openxmlformats.org/officeDocument/2006/relationships" xmlns:p="http://schemas.openxmlformats.org/presentationml/2006/main">
+  <p:cSld>
+    <p:spTree>
+      <p:nvGrpSpPr>
+        <p:cNvPr id="1" name=""/>
+        <p:cNvGrpSpPr/>
+        <p:nvPr/>
+      </p:nvGrpSpPr>
+      <p:grpSpPr>
+        <a:xfrm>
+          <a:off x="0" y="0"/>
+          <a:ext cx="0" cy="0"/>
+          <a:chOff x="0" y="0"/>
+          <a:chExt cx="0" cy="0"/>
+        </a:xfrm>
+      </p:grpSpPr>
+      <p:sp>
+        <p:nvSpPr>
+          <p:cNvPr id="2" name="Title 1"/>
+          <p:cNvSpPr>
+            <a:spLocks noGrp="1"/>
+          </p:cNvSpPr>
+          <p:nvPr>
+            <p:ph type="title"/>
+          </p:nvPr>
+        </p:nvSpPr>
+        <p:spPr/>
+        <p:txBody>
+          <a:bodyPr/>
+          <a:lstStyle/>
+          <a:p>
+            <a:r>
+              <a:rPr lang="fi-FI" dirty="0" smtClean="0"/>
+              <a:t>Future work</a:t>
+            </a:r>
+            <a:endParaRPr lang="fi-FI" dirty="0"/>
+          </a:p>
+        </p:txBody>
+      </p:sp>
+      <p:sp>
+        <p:nvSpPr>
+          <p:cNvPr id="3" name="Content Placeholder 2"/>
+          <p:cNvSpPr>
+            <a:spLocks noGrp="1"/>
+          </p:cNvSpPr>
+          <p:nvPr>
+            <p:ph idx="1"/>
+          </p:nvPr>
+        </p:nvSpPr>
+        <p:spPr/>
+        <p:txBody>
+          <a:bodyPr/>
+          <a:lstStyle/>
+          <a:p>
+            <a:r>
+              <a:rPr lang="fi-FI" dirty="0" smtClean="0"/>
+              <a:t>Enhance the preprocessing making it less dependant on arguments.</a:t>
+            </a:r>
+          </a:p>
+          <a:p>
+            <a:r>
+              <a:rPr lang="fi-FI" dirty="0" smtClean="0"/>
+              <a:t>Combine letters and symbols containing separate elements. (i j ! ? ” = ; : %)</a:t>
+            </a:r>
+          </a:p>
+          <a:p>
+            <a:pPr lvl="1"/>
+            <a:endParaRPr lang="fi-FI" dirty="0" smtClean="0"/>
+          </a:p>
+          <a:p>
+            <a:pPr lvl="1"/>
+            <a:endParaRPr lang="fi-FI" dirty="0"/>
+          </a:p>
+        </p:txBody>
+      </p:sp>
+      <p:sp>
+        <p:nvSpPr>
+          <p:cNvPr id="4" name="Footer Placeholder 3"/>
+          <p:cNvSpPr>
+            <a:spLocks noGrp="1"/>
+          </p:cNvSpPr>
+          <p:nvPr>
+            <p:ph type="ftr" sz="quarter" idx="10"/>
+          </p:nvPr>
+        </p:nvSpPr>
+        <p:spPr/>
+        <p:txBody>
+          <a:bodyPr/>
+          <a:lstStyle/>
+          <a:p>
+            <a:r>
+              <a:rPr lang="ja-JP" altLang="en-US" dirty="0" smtClean="0"/>
+              <a:t>研究室ゼミ</a:t>
+            </a:r>
+            <a:endParaRPr lang="en-US" altLang="ja-JP" dirty="0"/>
+          </a:p>
+        </p:txBody>
+      </p:sp>
+      <p:sp>
+        <p:nvSpPr>
+          <p:cNvPr id="5" name="Slide Number Placeholder 4"/>
+          <p:cNvSpPr>
+            <a:spLocks noGrp="1"/>
+          </p:cNvSpPr>
+          <p:nvPr>
+            <p:ph type="sldNum" sz="quarter" idx="11"/>
+          </p:nvPr>
+        </p:nvSpPr>
+        <p:spPr/>
+        <p:txBody>
+          <a:bodyPr/>
+          <a:lstStyle/>
+          <a:p>
+            <a:fld id="{87D0AC98-BE4D-4AA9-9598-A155CF901337}" type="slidenum">
+              <a:rPr lang="en-US" altLang="ja-JP" smtClean="0"/>
+              <a:pPr/>
+              <a:t>22</a:t>
+            </a:fld>
+            <a:endParaRPr lang="en-US" altLang="ja-JP"/>
+          </a:p>
+        </p:txBody>
+      </p:sp>
+      <p:pic>
+        <p:nvPicPr>
+          <p:cNvPr id="7" name="Picture 6"/>
+          <p:cNvPicPr>
+            <a:picLocks noChangeAspect="1"/>
+          </p:cNvPicPr>
+          <p:nvPr/>
+        </p:nvPicPr>
+        <p:blipFill rotWithShape="1">
+          <a:blip r:embed="rId2">
+            <a:extLst>
+              <a:ext uri="{28A0092B-C50C-407E-A947-70E740481C1C}">
+                <a14:useLocalDpi xmlns:a14="http://schemas.microsoft.com/office/drawing/2010/main" val="0"/>
+              </a:ext>
+            </a:extLst>
+          </a:blip>
+          <a:srcRect l="36944" t="29335" r="52524" b="56584"/>
+          <a:stretch/>
+        </p:blipFill>
+        <p:spPr>
+          <a:xfrm>
+            <a:off x="826387" y="3284984"/>
+            <a:ext cx="1368153" cy="1296144"/>
+          </a:xfrm>
+          <a:prstGeom prst="rect">
+            <a:avLst/>
+          </a:prstGeom>
+        </p:spPr>
+      </p:pic>
+      <p:pic>
+        <p:nvPicPr>
+          <p:cNvPr id="8" name="Picture 7"/>
+          <p:cNvPicPr>
+            <a:picLocks noChangeAspect="1"/>
+          </p:cNvPicPr>
+          <p:nvPr/>
+        </p:nvPicPr>
+        <p:blipFill rotWithShape="1">
+          <a:blip r:embed="rId2">
+            <a:extLst>
+              <a:ext uri="{28A0092B-C50C-407E-A947-70E740481C1C}">
+                <a14:useLocalDpi xmlns:a14="http://schemas.microsoft.com/office/drawing/2010/main" val="0"/>
+              </a:ext>
+            </a:extLst>
+          </a:blip>
+          <a:srcRect l="9931" t="62294" r="75261" b="23243"/>
+          <a:stretch/>
+        </p:blipFill>
+        <p:spPr>
+          <a:xfrm>
+            <a:off x="2525627" y="3275638"/>
+            <a:ext cx="1886482" cy="1305490"/>
+          </a:xfrm>
+          <a:prstGeom prst="rect">
+            <a:avLst/>
+          </a:prstGeom>
+        </p:spPr>
+      </p:pic>
+    </p:spTree>
+    <p:extLst>
+      <p:ext uri="{BB962C8B-B14F-4D97-AF65-F5344CB8AC3E}">
+        <p14:creationId xmlns:p14="http://schemas.microsoft.com/office/powerpoint/2010/main" val="3761696870"/>
+      </p:ext>
+    </p:extLst>
+  </p:cSld>
+  <p:clrMapOvr>
+    <a:masterClrMapping/>
+  </p:clrMapOvr>
+  <p:timing>
+    <p:tnLst>
+      <p:par>
+        <p:cTn id="1" dur="indefinite" restart="never" nodeType="tmRoot"/>
+      </p:par>
+    </p:tnLst>
+  </p:timing>
+</p:sld>
+</file>
+
+<file path=ppt/slides/slide24.xml><?xml version="1.0" encoding="utf-8"?>
+<p:sld xmlns:a="http://schemas.openxmlformats.org/drawingml/2006/main" xmlns:r="http://schemas.openxmlformats.org/officeDocument/2006/relationships" xmlns:p="http://schemas.openxmlformats.org/presentationml/2006/main">
+  <p:cSld>
+    <p:spTree>
+      <p:nvGrpSpPr>
+        <p:cNvPr id="1" name=""/>
+        <p:cNvGrpSpPr/>
+        <p:nvPr/>
+      </p:nvGrpSpPr>
+      <p:grpSpPr>
+        <a:xfrm>
+          <a:off x="0" y="0"/>
+          <a:ext cx="0" cy="0"/>
+          <a:chOff x="0" y="0"/>
+          <a:chExt cx="0" cy="0"/>
+        </a:xfrm>
+      </p:grpSpPr>
+      <p:sp>
+        <p:nvSpPr>
+          <p:cNvPr id="2" name="Title 1"/>
+          <p:cNvSpPr>
+            <a:spLocks noGrp="1"/>
+          </p:cNvSpPr>
+          <p:nvPr>
+            <p:ph type="title"/>
+          </p:nvPr>
+        </p:nvSpPr>
+        <p:spPr/>
+        <p:txBody>
+          <a:bodyPr/>
+          <a:lstStyle/>
+          <a:p>
+            <a:r>
+              <a:rPr lang="fi-FI" dirty="0" smtClean="0"/>
+              <a:t>Future work 2</a:t>
+            </a:r>
+            <a:endParaRPr lang="fi-FI" dirty="0"/>
+          </a:p>
+        </p:txBody>
+      </p:sp>
+      <p:sp>
+        <p:nvSpPr>
+          <p:cNvPr id="3" name="Content Placeholder 2"/>
+          <p:cNvSpPr>
+            <a:spLocks noGrp="1"/>
+          </p:cNvSpPr>
+          <p:nvPr>
+            <p:ph idx="1"/>
+          </p:nvPr>
+        </p:nvSpPr>
+        <p:spPr/>
+        <p:txBody>
+          <a:bodyPr/>
+          <a:lstStyle/>
+          <a:p>
+            <a:r>
+              <a:rPr lang="fi-FI" dirty="0"/>
+              <a:t>Layout analysis. </a:t>
+            </a:r>
+            <a:r>
+              <a:rPr lang="fi-FI" dirty="0" smtClean="0"/>
+              <a:t>Detect words, rows and </a:t>
+            </a:r>
+            <a:r>
+              <a:rPr lang="fi-FI" dirty="0"/>
+              <a:t>columns of text.</a:t>
+            </a:r>
+          </a:p>
+          <a:p>
+            <a:r>
+              <a:rPr lang="fi-FI" dirty="0"/>
+              <a:t>Feature </a:t>
+            </a:r>
+            <a:r>
+              <a:rPr lang="fi-FI" dirty="0" smtClean="0"/>
+              <a:t>extraction:</a:t>
+            </a:r>
+            <a:endParaRPr lang="fi-FI" dirty="0"/>
+          </a:p>
+          <a:p>
+            <a:pPr lvl="1"/>
+            <a:r>
+              <a:rPr lang="fi-FI" dirty="0"/>
+              <a:t>Vertical and horizontal </a:t>
+            </a:r>
+            <a:r>
+              <a:rPr lang="fi-FI" dirty="0" smtClean="0"/>
+              <a:t>histograms.</a:t>
+            </a:r>
+            <a:endParaRPr lang="fi-FI" dirty="0"/>
+          </a:p>
+          <a:p>
+            <a:pPr lvl="1"/>
+            <a:r>
+              <a:rPr lang="fi-FI" dirty="0"/>
+              <a:t>Histogram of ordered </a:t>
+            </a:r>
+            <a:r>
+              <a:rPr lang="fi-FI" dirty="0" smtClean="0"/>
+              <a:t>gradients.</a:t>
+            </a:r>
+            <a:endParaRPr lang="fi-FI" dirty="0"/>
+          </a:p>
+          <a:p>
+            <a:pPr lvl="1"/>
+            <a:r>
+              <a:rPr lang="fi-FI" dirty="0"/>
+              <a:t>Topological features such as endpoints, loops and </a:t>
+            </a:r>
+            <a:r>
+              <a:rPr lang="fi-FI" dirty="0" smtClean="0"/>
+              <a:t>junctions.</a:t>
+            </a:r>
+          </a:p>
+          <a:p>
+            <a:r>
+              <a:rPr lang="fi-FI" dirty="0" smtClean="0"/>
+              <a:t>Classification with k-means clustering.</a:t>
+            </a:r>
+          </a:p>
+          <a:p>
+            <a:r>
+              <a:rPr lang="fi-FI" dirty="0" smtClean="0"/>
+              <a:t>Use IAM database for large scale tests.</a:t>
+            </a:r>
+          </a:p>
+          <a:p>
+            <a:pPr lvl="1"/>
+            <a:endParaRPr lang="fi-FI" dirty="0"/>
+          </a:p>
+          <a:p>
+            <a:endParaRPr lang="fi-FI" dirty="0"/>
+          </a:p>
+        </p:txBody>
+      </p:sp>
+      <p:sp>
+        <p:nvSpPr>
+          <p:cNvPr id="4" name="Footer Placeholder 3"/>
+          <p:cNvSpPr>
+            <a:spLocks noGrp="1"/>
+          </p:cNvSpPr>
+          <p:nvPr>
+            <p:ph type="ftr" sz="quarter" idx="10"/>
+          </p:nvPr>
+        </p:nvSpPr>
+        <p:spPr/>
+        <p:txBody>
+          <a:bodyPr/>
+          <a:lstStyle/>
+          <a:p>
+            <a:r>
+              <a:rPr lang="ja-JP" altLang="en-US" smtClean="0"/>
+              <a:t>研究室ゼミ</a:t>
+            </a:r>
+            <a:endParaRPr lang="en-US" altLang="ja-JP"/>
+          </a:p>
+        </p:txBody>
+      </p:sp>
+      <p:sp>
+        <p:nvSpPr>
+          <p:cNvPr id="5" name="Slide Number Placeholder 4"/>
+          <p:cNvSpPr>
+            <a:spLocks noGrp="1"/>
+          </p:cNvSpPr>
+          <p:nvPr>
+            <p:ph type="sldNum" sz="quarter" idx="11"/>
+          </p:nvPr>
+        </p:nvSpPr>
+        <p:spPr/>
+        <p:txBody>
+          <a:bodyPr/>
+          <a:lstStyle/>
+          <a:p>
+            <a:fld id="{87D0AC98-BE4D-4AA9-9598-A155CF901337}" type="slidenum">
+              <a:rPr lang="en-US" altLang="ja-JP" smtClean="0"/>
+              <a:pPr/>
+              <a:t>23</a:t>
+            </a:fld>
+            <a:endParaRPr lang="en-US" altLang="ja-JP"/>
+          </a:p>
+        </p:txBody>
+      </p:sp>
+    </p:spTree>
+    <p:extLst>
+      <p:ext uri="{BB962C8B-B14F-4D97-AF65-F5344CB8AC3E}">
+        <p14:creationId xmlns:p14="http://schemas.microsoft.com/office/powerpoint/2010/main" val="2223990625"/>
+      </p:ext>
+    </p:extLst>
+  </p:cSld>
+  <p:clrMapOvr>
+    <a:masterClrMapping/>
+  </p:clrMapOvr>
+  <p:timing>
+    <p:tnLst>
+      <p:par>
+        <p:cTn id="1" dur="indefinite" restart="never" nodeType="tmRoot"/>
+      </p:par>
+    </p:tnLst>
+  </p:timing>
+</p:sld>
+</file>
+
+<file path=ppt/slides/slide25.xml><?xml version="1.0" encoding="utf-8"?>
 <p:sld xmlns:a="http://schemas.openxmlformats.org/drawingml/2006/main" xmlns:r="http://schemas.openxmlformats.org/officeDocument/2006/relationships" xmlns:p="http://schemas.openxmlformats.org/presentationml/2006/main">
   <p:cSld>
     <p:spTree>
@@ -7707,7 +9981,7 @@
             <a:fld id="{87D0AC98-BE4D-4AA9-9598-A155CF901337}" type="slidenum">
               <a:rPr lang="en-US" altLang="ja-JP" smtClean="0"/>
               <a:pPr/>
-              <a:t>12</a:t>
+              <a:t>24</a:t>
             </a:fld>
             <a:endParaRPr lang="en-US" altLang="ja-JP"/>
           </a:p>
@@ -7819,7 +10093,7 @@
 </p:sld>
 </file>
 
-<file path=ppt/slides/slide14.xml><?xml version="1.0" encoding="utf-8"?>
+<file path=ppt/slides/slide26.xml><?xml version="1.0" encoding="utf-8"?>
 <p:sld xmlns:a="http://schemas.openxmlformats.org/drawingml/2006/main" xmlns:r="http://schemas.openxmlformats.org/officeDocument/2006/relationships" xmlns:p="http://schemas.openxmlformats.org/presentationml/2006/main">
   <p:cSld>
     <p:spTree>
@@ -8334,7 +10608,7 @@
             <a:fld id="{C910A64F-5FA4-4BB5-8FE5-6E90393AA66F}" type="slidenum">
               <a:rPr lang="en-US" altLang="ja-JP" smtClean="0"/>
               <a:pPr/>
-              <a:t>13</a:t>
+              <a:t>25</a:t>
             </a:fld>
             <a:endParaRPr lang="en-US" altLang="ja-JP"/>
           </a:p>
@@ -8670,7 +10944,7 @@
 </p:sld>
 </file>
 
-<file path=ppt/slides/slide15.xml><?xml version="1.0" encoding="utf-8"?>
+<file path=ppt/slides/slide27.xml><?xml version="1.0" encoding="utf-8"?>
 <p:sld xmlns:a="http://schemas.openxmlformats.org/drawingml/2006/main" xmlns:r="http://schemas.openxmlformats.org/officeDocument/2006/relationships" xmlns:p="http://schemas.openxmlformats.org/presentationml/2006/main">
   <p:cSld>
     <p:spTree>
@@ -10429,7 +12703,7 @@
             <a:fld id="{C910A64F-5FA4-4BB5-8FE5-6E90393AA66F}" type="slidenum">
               <a:rPr lang="en-US" altLang="ja-JP" smtClean="0"/>
               <a:pPr/>
-              <a:t>14</a:t>
+              <a:t>26</a:t>
             </a:fld>
             <a:endParaRPr lang="en-US" altLang="ja-JP"/>
           </a:p>
@@ -10455,7 +12729,7 @@
 </p:sld>
 </file>
 
-<file path=ppt/slides/slide16.xml><?xml version="1.0" encoding="utf-8"?>
+<file path=ppt/slides/slide28.xml><?xml version="1.0" encoding="utf-8"?>
 <p:sld xmlns:a="http://schemas.openxmlformats.org/drawingml/2006/main" xmlns:r="http://schemas.openxmlformats.org/officeDocument/2006/relationships" xmlns:p="http://schemas.openxmlformats.org/presentationml/2006/main">
   <p:cSld>
     <p:spTree>
@@ -11844,7 +14118,7 @@
             <a:fld id="{C910A64F-5FA4-4BB5-8FE5-6E90393AA66F}" type="slidenum">
               <a:rPr lang="en-US" altLang="ja-JP" smtClean="0"/>
               <a:pPr/>
-              <a:t>15</a:t>
+              <a:t>27</a:t>
             </a:fld>
             <a:endParaRPr lang="en-US" altLang="ja-JP"/>
           </a:p>
@@ -12523,7 +14797,7 @@
 </p:sld>
 </file>
 
-<file path=ppt/slides/slide17.xml><?xml version="1.0" encoding="utf-8"?>
+<file path=ppt/slides/slide29.xml><?xml version="1.0" encoding="utf-8"?>
 <p:sld xmlns:a="http://schemas.openxmlformats.org/drawingml/2006/main" xmlns:r="http://schemas.openxmlformats.org/officeDocument/2006/relationships" xmlns:p="http://schemas.openxmlformats.org/presentationml/2006/main">
   <p:cSld>
     <p:spTree>
@@ -12673,7 +14947,7 @@
             <a:fld id="{C910A64F-5FA4-4BB5-8FE5-6E90393AA66F}" type="slidenum">
               <a:rPr lang="en-US" altLang="ja-JP" smtClean="0"/>
               <a:pPr/>
-              <a:t>16</a:t>
+              <a:t>28</a:t>
             </a:fld>
             <a:endParaRPr lang="en-US" altLang="ja-JP"/>
           </a:p>
@@ -12699,7 +14973,7 @@
 </p:sld>
 </file>
 
-<file path=ppt/slides/slide18.xml><?xml version="1.0" encoding="utf-8"?>
+<file path=ppt/slides/slide3.xml><?xml version="1.0" encoding="utf-8"?>
 <p:sld xmlns:a="http://schemas.openxmlformats.org/drawingml/2006/main" xmlns:r="http://schemas.openxmlformats.org/officeDocument/2006/relationships" xmlns:p="http://schemas.openxmlformats.org/presentationml/2006/main">
   <p:cSld>
     <p:spTree>
@@ -12718,6 +14992,170 @@
       </p:grpSpPr>
       <p:sp>
         <p:nvSpPr>
+          <p:cNvPr id="2" name="タイトル 1"/>
+          <p:cNvSpPr>
+            <a:spLocks noGrp="1"/>
+          </p:cNvSpPr>
+          <p:nvPr>
+            <p:ph type="title"/>
+          </p:nvPr>
+        </p:nvSpPr>
+        <p:spPr/>
+        <p:txBody>
+          <a:bodyPr/>
+          <a:lstStyle/>
+          <a:p>
+            <a:r>
+              <a:rPr lang="fi-FI" altLang="ja-JP" dirty="0" smtClean="0"/>
+              <a:t>Introduction</a:t>
+            </a:r>
+            <a:endParaRPr kumimoji="1" lang="ja-JP" altLang="en-US" dirty="0"/>
+          </a:p>
+        </p:txBody>
+      </p:sp>
+      <p:sp>
+        <p:nvSpPr>
+          <p:cNvPr id="3" name="コンテンツ プレースホルダー 2"/>
+          <p:cNvSpPr>
+            <a:spLocks noGrp="1"/>
+          </p:cNvSpPr>
+          <p:nvPr>
+            <p:ph idx="1"/>
+          </p:nvPr>
+        </p:nvSpPr>
+        <p:spPr>
+          <a:xfrm>
+            <a:off x="495300" y="908720"/>
+            <a:ext cx="8915400" cy="5400675"/>
+          </a:xfrm>
+        </p:spPr>
+        <p:txBody>
+          <a:bodyPr/>
+          <a:lstStyle/>
+          <a:p>
+            <a:r>
+              <a:rPr kumimoji="1" lang="fi-FI" altLang="ja-JP" dirty="0" smtClean="0"/>
+              <a:t>Handwriting recognition (HWR) is the process of extracting text in digital form from handwritten images or input devices</a:t>
+            </a:r>
+            <a:r>
+              <a:rPr kumimoji="1" lang="fi-FI" altLang="ja-JP" dirty="0" smtClean="0"/>
+              <a:t>.</a:t>
+            </a:r>
+            <a:endParaRPr kumimoji="1" lang="fi-FI" altLang="ja-JP" dirty="0" smtClean="0"/>
+          </a:p>
+          <a:p>
+            <a:r>
+              <a:rPr lang="fi-FI" altLang="ja-JP" dirty="0" smtClean="0"/>
+              <a:t>This </a:t>
+            </a:r>
+            <a:r>
+              <a:rPr lang="fi-FI" altLang="ja-JP" dirty="0" smtClean="0"/>
+              <a:t>phase of research concentrates on preprocessing.</a:t>
+            </a:r>
+          </a:p>
+          <a:p>
+            <a:r>
+              <a:rPr lang="fi-FI" altLang="ja-JP" dirty="0"/>
+              <a:t>Matlab was used for implementation.</a:t>
+            </a:r>
+          </a:p>
+          <a:p>
+            <a:r>
+              <a:rPr lang="fi-FI" altLang="ja-JP" dirty="0"/>
+              <a:t>IAM handwriting database provides wide variety of different handwriting styles in English.</a:t>
+            </a:r>
+          </a:p>
+          <a:p>
+            <a:endParaRPr lang="fi-FI" altLang="ja-JP" dirty="0" smtClean="0"/>
+          </a:p>
+        </p:txBody>
+      </p:sp>
+      <p:sp>
+        <p:nvSpPr>
+          <p:cNvPr id="5" name="フッター プレースホルダー 4"/>
+          <p:cNvSpPr>
+            <a:spLocks noGrp="1"/>
+          </p:cNvSpPr>
+          <p:nvPr>
+            <p:ph type="ftr" sz="quarter" idx="10"/>
+          </p:nvPr>
+        </p:nvSpPr>
+        <p:spPr/>
+        <p:txBody>
+          <a:bodyPr/>
+          <a:lstStyle/>
+          <a:p>
+            <a:r>
+              <a:rPr lang="ja-JP" altLang="en-US" smtClean="0"/>
+              <a:t>研究室ゼミ</a:t>
+            </a:r>
+            <a:endParaRPr lang="en-US" altLang="ja-JP"/>
+          </a:p>
+        </p:txBody>
+      </p:sp>
+      <p:sp>
+        <p:nvSpPr>
+          <p:cNvPr id="6" name="スライド番号プレースホルダー 5"/>
+          <p:cNvSpPr>
+            <a:spLocks noGrp="1"/>
+          </p:cNvSpPr>
+          <p:nvPr>
+            <p:ph type="sldNum" sz="quarter" idx="11"/>
+          </p:nvPr>
+        </p:nvSpPr>
+        <p:spPr/>
+        <p:txBody>
+          <a:bodyPr/>
+          <a:lstStyle/>
+          <a:p>
+            <a:fld id="{87D0AC98-BE4D-4AA9-9598-A155CF901337}" type="slidenum">
+              <a:rPr lang="en-US" altLang="ja-JP" smtClean="0"/>
+              <a:pPr/>
+              <a:t>2</a:t>
+            </a:fld>
+            <a:endParaRPr lang="en-US" altLang="ja-JP"/>
+          </a:p>
+        </p:txBody>
+      </p:sp>
+    </p:spTree>
+    <p:extLst>
+      <p:ext uri="{BB962C8B-B14F-4D97-AF65-F5344CB8AC3E}">
+        <p14:creationId xmlns:p14="http://schemas.microsoft.com/office/powerpoint/2010/main" val="2769271896"/>
+      </p:ext>
+    </p:extLst>
+  </p:cSld>
+  <p:clrMapOvr>
+    <a:masterClrMapping/>
+  </p:clrMapOvr>
+  <p:timing>
+    <p:tnLst>
+      <p:par>
+        <p:cTn id="1" dur="indefinite" restart="never" nodeType="tmRoot"/>
+      </p:par>
+    </p:tnLst>
+  </p:timing>
+</p:sld>
+</file>
+
+<file path=ppt/slides/slide30.xml><?xml version="1.0" encoding="utf-8"?>
+<p:sld xmlns:a="http://schemas.openxmlformats.org/drawingml/2006/main" xmlns:r="http://schemas.openxmlformats.org/officeDocument/2006/relationships" xmlns:p="http://schemas.openxmlformats.org/presentationml/2006/main">
+  <p:cSld>
+    <p:spTree>
+      <p:nvGrpSpPr>
+        <p:cNvPr id="1" name=""/>
+        <p:cNvGrpSpPr/>
+        <p:nvPr/>
+      </p:nvGrpSpPr>
+      <p:grpSpPr>
+        <a:xfrm>
+          <a:off x="0" y="0"/>
+          <a:ext cx="0" cy="0"/>
+          <a:chOff x="0" y="0"/>
+          <a:chExt cx="0" cy="0"/>
+        </a:xfrm>
+      </p:grpSpPr>
+      <p:sp>
+        <p:nvSpPr>
           <p:cNvPr id="5" name="コンテンツ プレースホルダー 4"/>
           <p:cNvSpPr>
             <a:spLocks noGrp="1"/>
@@ -12788,7 +15226,7 @@
             <a:fld id="{C910A64F-5FA4-4BB5-8FE5-6E90393AA66F}" type="slidenum">
               <a:rPr lang="en-US" altLang="ja-JP" smtClean="0"/>
               <a:pPr/>
-              <a:t>17</a:t>
+              <a:t>29</a:t>
             </a:fld>
             <a:endParaRPr lang="en-US" altLang="ja-JP"/>
           </a:p>
@@ -13267,320 +15705,6 @@
 </p:sld>
 </file>
 
-<file path=ppt/slides/slide2.xml><?xml version="1.0" encoding="utf-8"?>
-<p:sld xmlns:a="http://schemas.openxmlformats.org/drawingml/2006/main" xmlns:r="http://schemas.openxmlformats.org/officeDocument/2006/relationships" xmlns:p="http://schemas.openxmlformats.org/presentationml/2006/main">
-  <p:cSld>
-    <p:spTree>
-      <p:nvGrpSpPr>
-        <p:cNvPr id="1" name=""/>
-        <p:cNvGrpSpPr/>
-        <p:nvPr/>
-      </p:nvGrpSpPr>
-      <p:grpSpPr>
-        <a:xfrm>
-          <a:off x="0" y="0"/>
-          <a:ext cx="0" cy="0"/>
-          <a:chOff x="0" y="0"/>
-          <a:chExt cx="0" cy="0"/>
-        </a:xfrm>
-      </p:grpSpPr>
-      <p:sp>
-        <p:nvSpPr>
-          <p:cNvPr id="2" name="タイトル 1"/>
-          <p:cNvSpPr>
-            <a:spLocks noGrp="1"/>
-          </p:cNvSpPr>
-          <p:nvPr>
-            <p:ph type="title"/>
-          </p:nvPr>
-        </p:nvSpPr>
-        <p:spPr/>
-        <p:txBody>
-          <a:bodyPr/>
-          <a:lstStyle/>
-          <a:p>
-            <a:r>
-              <a:rPr lang="fi-FI" altLang="ja-JP" dirty="0" smtClean="0"/>
-              <a:t>Overview</a:t>
-            </a:r>
-            <a:endParaRPr kumimoji="1" lang="ja-JP" altLang="en-US" dirty="0"/>
-          </a:p>
-        </p:txBody>
-      </p:sp>
-      <p:sp>
-        <p:nvSpPr>
-          <p:cNvPr id="3" name="コンテンツ プレースホルダー 2"/>
-          <p:cNvSpPr>
-            <a:spLocks noGrp="1"/>
-          </p:cNvSpPr>
-          <p:nvPr>
-            <p:ph idx="1"/>
-          </p:nvPr>
-        </p:nvSpPr>
-        <p:spPr/>
-        <p:txBody>
-          <a:bodyPr/>
-          <a:lstStyle/>
-          <a:p>
-            <a:r>
-              <a:rPr lang="fi-FI" altLang="ja-JP" dirty="0" smtClean="0"/>
-              <a:t>Introduction</a:t>
-            </a:r>
-          </a:p>
-          <a:p>
-            <a:r>
-              <a:rPr lang="fi-FI" altLang="ja-JP" dirty="0" smtClean="0"/>
-              <a:t>Handwriting recognition</a:t>
-            </a:r>
-          </a:p>
-          <a:p>
-            <a:r>
-              <a:rPr lang="fi-FI" altLang="ja-JP" dirty="0" smtClean="0"/>
-              <a:t>Preprocessing</a:t>
-            </a:r>
-          </a:p>
-          <a:p>
-            <a:endParaRPr lang="en-US" altLang="ja-JP" dirty="0" smtClean="0"/>
-          </a:p>
-          <a:p>
-            <a:pPr lvl="1"/>
-            <a:endParaRPr lang="en-US" altLang="ja-JP" dirty="0" smtClean="0"/>
-          </a:p>
-          <a:p>
-            <a:pPr lvl="1"/>
-            <a:endParaRPr lang="en-US" altLang="ja-JP" dirty="0" smtClean="0"/>
-          </a:p>
-          <a:p>
-            <a:pPr lvl="1"/>
-            <a:endParaRPr kumimoji="1" lang="en-US" altLang="ja-JP" dirty="0" smtClean="0"/>
-          </a:p>
-          <a:p>
-            <a:pPr lvl="1"/>
-            <a:endParaRPr kumimoji="1" lang="en-US" altLang="ja-JP" dirty="0" smtClean="0"/>
-          </a:p>
-          <a:p>
-            <a:pPr lvl="1"/>
-            <a:endParaRPr kumimoji="1" lang="ja-JP" altLang="en-US" dirty="0"/>
-          </a:p>
-        </p:txBody>
-      </p:sp>
-      <p:sp>
-        <p:nvSpPr>
-          <p:cNvPr id="5" name="フッター プレースホルダー 4"/>
-          <p:cNvSpPr>
-            <a:spLocks noGrp="1"/>
-          </p:cNvSpPr>
-          <p:nvPr>
-            <p:ph type="ftr" sz="quarter" idx="10"/>
-          </p:nvPr>
-        </p:nvSpPr>
-        <p:spPr/>
-        <p:txBody>
-          <a:bodyPr/>
-          <a:lstStyle/>
-          <a:p>
-            <a:r>
-              <a:rPr lang="ja-JP" altLang="en-US" smtClean="0"/>
-              <a:t>研究室ゼミ</a:t>
-            </a:r>
-            <a:endParaRPr lang="en-US" altLang="ja-JP"/>
-          </a:p>
-        </p:txBody>
-      </p:sp>
-      <p:sp>
-        <p:nvSpPr>
-          <p:cNvPr id="6" name="スライド番号プレースホルダー 5"/>
-          <p:cNvSpPr>
-            <a:spLocks noGrp="1"/>
-          </p:cNvSpPr>
-          <p:nvPr>
-            <p:ph type="sldNum" sz="quarter" idx="11"/>
-          </p:nvPr>
-        </p:nvSpPr>
-        <p:spPr/>
-        <p:txBody>
-          <a:bodyPr/>
-          <a:lstStyle/>
-          <a:p>
-            <a:fld id="{87D0AC98-BE4D-4AA9-9598-A155CF901337}" type="slidenum">
-              <a:rPr lang="en-US" altLang="ja-JP" smtClean="0"/>
-              <a:pPr/>
-              <a:t>1</a:t>
-            </a:fld>
-            <a:endParaRPr lang="en-US" altLang="ja-JP"/>
-          </a:p>
-        </p:txBody>
-      </p:sp>
-    </p:spTree>
-    <p:extLst>
-      <p:ext uri="{BB962C8B-B14F-4D97-AF65-F5344CB8AC3E}">
-        <p14:creationId xmlns:p14="http://schemas.microsoft.com/office/powerpoint/2010/main" val="1174836993"/>
-      </p:ext>
-    </p:extLst>
-  </p:cSld>
-  <p:clrMapOvr>
-    <a:masterClrMapping/>
-  </p:clrMapOvr>
-  <p:timing>
-    <p:tnLst>
-      <p:par>
-        <p:cTn id="1" dur="indefinite" restart="never" nodeType="tmRoot"/>
-      </p:par>
-    </p:tnLst>
-  </p:timing>
-</p:sld>
-</file>
-
-<file path=ppt/slides/slide3.xml><?xml version="1.0" encoding="utf-8"?>
-<p:sld xmlns:a="http://schemas.openxmlformats.org/drawingml/2006/main" xmlns:r="http://schemas.openxmlformats.org/officeDocument/2006/relationships" xmlns:p="http://schemas.openxmlformats.org/presentationml/2006/main">
-  <p:cSld>
-    <p:spTree>
-      <p:nvGrpSpPr>
-        <p:cNvPr id="1" name=""/>
-        <p:cNvGrpSpPr/>
-        <p:nvPr/>
-      </p:nvGrpSpPr>
-      <p:grpSpPr>
-        <a:xfrm>
-          <a:off x="0" y="0"/>
-          <a:ext cx="0" cy="0"/>
-          <a:chOff x="0" y="0"/>
-          <a:chExt cx="0" cy="0"/>
-        </a:xfrm>
-      </p:grpSpPr>
-      <p:sp>
-        <p:nvSpPr>
-          <p:cNvPr id="2" name="タイトル 1"/>
-          <p:cNvSpPr>
-            <a:spLocks noGrp="1"/>
-          </p:cNvSpPr>
-          <p:nvPr>
-            <p:ph type="title"/>
-          </p:nvPr>
-        </p:nvSpPr>
-        <p:spPr/>
-        <p:txBody>
-          <a:bodyPr/>
-          <a:lstStyle/>
-          <a:p>
-            <a:r>
-              <a:rPr lang="fi-FI" altLang="ja-JP" dirty="0" smtClean="0"/>
-              <a:t>Introduction</a:t>
-            </a:r>
-            <a:endParaRPr kumimoji="1" lang="ja-JP" altLang="en-US" dirty="0"/>
-          </a:p>
-        </p:txBody>
-      </p:sp>
-      <p:sp>
-        <p:nvSpPr>
-          <p:cNvPr id="3" name="コンテンツ プレースホルダー 2"/>
-          <p:cNvSpPr>
-            <a:spLocks noGrp="1"/>
-          </p:cNvSpPr>
-          <p:nvPr>
-            <p:ph idx="1"/>
-          </p:nvPr>
-        </p:nvSpPr>
-        <p:spPr/>
-        <p:txBody>
-          <a:bodyPr/>
-          <a:lstStyle/>
-          <a:p>
-            <a:r>
-              <a:rPr kumimoji="1" lang="fi-FI" altLang="ja-JP" dirty="0" smtClean="0"/>
-              <a:t>Handwriting recognition (HWR) is the process of extracting text in digital form from handwritten images or input devices.</a:t>
-            </a:r>
-          </a:p>
-          <a:p>
-            <a:r>
-              <a:rPr lang="fi-FI" altLang="ja-JP" dirty="0" smtClean="0"/>
-              <a:t>Matlab used for implementation.</a:t>
-            </a:r>
-          </a:p>
-          <a:p>
-            <a:r>
-              <a:rPr lang="fi-FI" altLang="ja-JP" dirty="0" smtClean="0"/>
-              <a:t>IAM handwriting database provides wide variety of different handwriting styles in English.</a:t>
-            </a:r>
-          </a:p>
-          <a:p>
-            <a:r>
-              <a:rPr lang="fi-FI" altLang="ja-JP" dirty="0" smtClean="0"/>
-              <a:t>This phase of research concentrates on preprocessing.</a:t>
-            </a:r>
-          </a:p>
-          <a:p>
-            <a:endParaRPr lang="fi-FI" altLang="ja-JP" dirty="0" smtClean="0"/>
-          </a:p>
-        </p:txBody>
-      </p:sp>
-      <p:sp>
-        <p:nvSpPr>
-          <p:cNvPr id="5" name="フッター プレースホルダー 4"/>
-          <p:cNvSpPr>
-            <a:spLocks noGrp="1"/>
-          </p:cNvSpPr>
-          <p:nvPr>
-            <p:ph type="ftr" sz="quarter" idx="10"/>
-          </p:nvPr>
-        </p:nvSpPr>
-        <p:spPr/>
-        <p:txBody>
-          <a:bodyPr/>
-          <a:lstStyle/>
-          <a:p>
-            <a:r>
-              <a:rPr lang="ja-JP" altLang="en-US" smtClean="0"/>
-              <a:t>研究室ゼミ</a:t>
-            </a:r>
-            <a:endParaRPr lang="en-US" altLang="ja-JP"/>
-          </a:p>
-        </p:txBody>
-      </p:sp>
-      <p:sp>
-        <p:nvSpPr>
-          <p:cNvPr id="6" name="スライド番号プレースホルダー 5"/>
-          <p:cNvSpPr>
-            <a:spLocks noGrp="1"/>
-          </p:cNvSpPr>
-          <p:nvPr>
-            <p:ph type="sldNum" sz="quarter" idx="11"/>
-          </p:nvPr>
-        </p:nvSpPr>
-        <p:spPr/>
-        <p:txBody>
-          <a:bodyPr/>
-          <a:lstStyle/>
-          <a:p>
-            <a:fld id="{87D0AC98-BE4D-4AA9-9598-A155CF901337}" type="slidenum">
-              <a:rPr lang="en-US" altLang="ja-JP" smtClean="0"/>
-              <a:pPr/>
-              <a:t>2</a:t>
-            </a:fld>
-            <a:endParaRPr lang="en-US" altLang="ja-JP"/>
-          </a:p>
-        </p:txBody>
-      </p:sp>
-    </p:spTree>
-    <p:extLst>
-      <p:ext uri="{BB962C8B-B14F-4D97-AF65-F5344CB8AC3E}">
-        <p14:creationId xmlns:p14="http://schemas.microsoft.com/office/powerpoint/2010/main" val="2769271896"/>
-      </p:ext>
-    </p:extLst>
-  </p:cSld>
-  <p:clrMapOvr>
-    <a:masterClrMapping/>
-  </p:clrMapOvr>
-  <p:timing>
-    <p:tnLst>
-      <p:par>
-        <p:cTn id="1" dur="indefinite" restart="never" nodeType="tmRoot"/>
-      </p:par>
-    </p:tnLst>
-  </p:timing>
-</p:sld>
-</file>
-
 <file path=ppt/slides/slide4.xml><?xml version="1.0" encoding="utf-8"?>
 <p:sld xmlns:a="http://schemas.openxmlformats.org/drawingml/2006/main" xmlns:r="http://schemas.openxmlformats.org/officeDocument/2006/relationships" xmlns:p="http://schemas.openxmlformats.org/presentationml/2006/main">
   <p:cSld>
@@ -13631,7 +15755,12 @@
             <p:ph idx="1"/>
           </p:nvPr>
         </p:nvSpPr>
-        <p:spPr/>
+        <p:spPr>
+          <a:xfrm>
+            <a:off x="495300" y="908720"/>
+            <a:ext cx="8915400" cy="5400675"/>
+          </a:xfrm>
+        </p:spPr>
         <p:txBody>
           <a:bodyPr/>
           <a:lstStyle/>
@@ -13678,7 +15807,7 @@
           <a:p>
             <a:pPr lvl="1"/>
             <a:r>
-              <a:rPr lang="en-US" altLang="ja-JP" dirty="0"/>
+              <a:rPr lang="en-US" altLang="ja-JP" dirty="0" smtClean="0"/>
               <a:t>Classification</a:t>
             </a:r>
           </a:p>
@@ -14019,8 +16148,9 @@
           <a:p>
             <a:r>
               <a:rPr lang="fi-FI" dirty="0" smtClean="0"/>
-              <a:t>For this research the chosen research subjects are the preprocessing and feature extraction phases. </a:t>
-            </a:r>
+              <a:t>For now the research has concentrated on preprocessing.</a:t>
+            </a:r>
+            <a:endParaRPr lang="fi-FI" dirty="0" smtClean="0"/>
           </a:p>
           <a:p>
             <a:endParaRPr lang="fi-FI" dirty="0" smtClean="0"/>
@@ -14090,6 +16220,13 @@
   <p:clrMapOvr>
     <a:masterClrMapping/>
   </p:clrMapOvr>
+  <p:timing>
+    <p:tnLst>
+      <p:par>
+        <p:cTn id="1" dur="indefinite" restart="never" nodeType="tmRoot"/>
+      </p:par>
+    </p:tnLst>
+  </p:timing>
 </p:sld>
 </file>
 
@@ -14150,7 +16287,19 @@
           <a:p>
             <a:r>
               <a:rPr lang="fi-FI" dirty="0" smtClean="0"/>
-              <a:t>During this research following preprocessing features were considered:</a:t>
+              <a:t>During this research following preprocessing </a:t>
+            </a:r>
+            <a:r>
+              <a:rPr lang="fi-FI" dirty="0" smtClean="0"/>
+              <a:t>methods</a:t>
+            </a:r>
+            <a:r>
+              <a:rPr lang="fi-FI" dirty="0" smtClean="0"/>
+              <a:t> </a:t>
+            </a:r>
+            <a:r>
+              <a:rPr lang="fi-FI" dirty="0" smtClean="0"/>
+              <a:t>were considered:</a:t>
             </a:r>
           </a:p>
           <a:p>
@@ -14178,8 +16327,13 @@
             <a:pPr lvl="1"/>
             <a:r>
               <a:rPr lang="fi-FI" dirty="0" smtClean="0"/>
-              <a:t>Object filtering</a:t>
-            </a:r>
+              <a:t>Object </a:t>
+            </a:r>
+            <a:r>
+              <a:rPr lang="fi-FI" dirty="0" smtClean="0"/>
+              <a:t>property analysis</a:t>
+            </a:r>
+            <a:endParaRPr lang="fi-FI" dirty="0" smtClean="0"/>
           </a:p>
           <a:p>
             <a:pPr lvl="1"/>
@@ -14248,6 +16402,13 @@
   <p:clrMapOvr>
     <a:masterClrMapping/>
   </p:clrMapOvr>
+  <p:timing>
+    <p:tnLst>
+      <p:par>
+        <p:cTn id="1" dur="indefinite" restart="never" nodeType="tmRoot"/>
+      </p:par>
+    </p:tnLst>
+  </p:timing>
 </p:sld>
 </file>
 
@@ -14334,8 +16495,13 @@
           <a:p>
             <a:r>
               <a:rPr lang="fi-FI" dirty="0" smtClean="0"/>
-              <a:t>Histogram equalization is not applied because in most cases it increased the visibility of irrelevant objects such as paper texture.</a:t>
-            </a:r>
+              <a:t>Histogram equalization is not applied because in most cases it increased the visibility of irrelevant objects such as paper </a:t>
+            </a:r>
+            <a:r>
+              <a:rPr lang="fi-FI" dirty="0" smtClean="0"/>
+              <a:t>texture and noise.</a:t>
+            </a:r>
+            <a:endParaRPr lang="fi-FI" dirty="0" smtClean="0"/>
           </a:p>
           <a:p>
             <a:endParaRPr lang="fi-FI" dirty="0" smtClean="0"/>
@@ -14414,6 +16580,13 @@
   <p:clrMapOvr>
     <a:masterClrMapping/>
   </p:clrMapOvr>
+  <p:timing>
+    <p:tnLst>
+      <p:par>
+        <p:cTn id="1" dur="indefinite" restart="never" nodeType="tmRoot"/>
+      </p:par>
+    </p:tnLst>
+  </p:timing>
 </p:sld>
 </file>
 
@@ -14451,7 +16624,7 @@
           <a:p>
             <a:r>
               <a:rPr lang="fi-FI" dirty="0" smtClean="0"/>
-              <a:t>Preprocessing 3 (Binarization)</a:t>
+              <a:t>Binarization</a:t>
             </a:r>
             <a:endParaRPr lang="fi-FI" dirty="0"/>
           </a:p>
@@ -14479,19 +16652,55 @@
           <a:p>
             <a:r>
               <a:rPr lang="fi-FI" dirty="0" smtClean="0"/>
-              <a:t>Binarization is important part of the preprocessing</a:t>
-            </a:r>
-          </a:p>
-          <a:p>
+              <a:t>Binarization </a:t>
+            </a:r>
             <a:r>
               <a:rPr lang="fi-FI" dirty="0" smtClean="0"/>
-              <a:t>Image may have uneven lighting resulting in visible shadows or gloss.</a:t>
-            </a:r>
-          </a:p>
-          <a:p>
+              <a:t>is one of the most </a:t>
+            </a:r>
             <a:r>
               <a:rPr lang="fi-FI" dirty="0" smtClean="0"/>
-              <a:t>Sauvola algorithm was designed for documant binarization purpose</a:t>
+              <a:t>important </a:t>
+            </a:r>
+            <a:r>
+              <a:rPr lang="fi-FI" dirty="0" smtClean="0"/>
+              <a:t>parts </a:t>
+            </a:r>
+            <a:r>
+              <a:rPr lang="fi-FI" dirty="0" smtClean="0"/>
+              <a:t>of the </a:t>
+            </a:r>
+            <a:r>
+              <a:rPr lang="fi-FI" dirty="0" smtClean="0"/>
+              <a:t>preprocessing.</a:t>
+            </a:r>
+            <a:endParaRPr lang="fi-FI" dirty="0" smtClean="0"/>
+          </a:p>
+          <a:p>
+            <a:r>
+              <a:rPr lang="fi-FI" dirty="0" smtClean="0"/>
+              <a:t>Image may have uneven lighting resulting in visible shadows or </a:t>
+            </a:r>
+            <a:r>
+              <a:rPr lang="fi-FI" dirty="0" smtClean="0"/>
+              <a:t>gloss.</a:t>
+            </a:r>
+            <a:endParaRPr lang="fi-FI" dirty="0" smtClean="0"/>
+          </a:p>
+          <a:p>
+            <a:r>
+              <a:rPr lang="fi-FI" dirty="0" smtClean="0"/>
+              <a:t>Sauvola algorithm was designed for documant binarization </a:t>
+            </a:r>
+            <a:r>
+              <a:rPr lang="fi-FI" dirty="0" smtClean="0"/>
+              <a:t>purpose.</a:t>
+            </a:r>
+          </a:p>
+          <a:p>
+            <a:r>
+              <a:rPr lang="fi-FI" dirty="0" smtClean="0"/>
+              <a:t>Sauvola algorithm resulted in best results with quick comparison with other algorithms.</a:t>
             </a:r>
             <a:endParaRPr lang="fi-FI" dirty="0"/>
           </a:p>

</xml_diff>